<commit_message>
minor clean-up of benchmarks pptx/pdf
</commit_message>
<xml_diff>
--- a/presentations/benchmarks.pptx
+++ b/presentations/benchmarks.pptx
@@ -6,22 +6,21 @@
     <p:sldMasterId id="2147483652" r:id="rId2"/>
   </p:sldMasterIdLst>
   <p:notesMasterIdLst>
-    <p:notesMasterId r:id="rId13"/>
+    <p:notesMasterId r:id="rId12"/>
   </p:notesMasterIdLst>
   <p:handoutMasterIdLst>
-    <p:handoutMasterId r:id="rId14"/>
+    <p:handoutMasterId r:id="rId13"/>
   </p:handoutMasterIdLst>
   <p:sldIdLst>
-    <p:sldId id="283" r:id="rId3"/>
-    <p:sldId id="296" r:id="rId4"/>
-    <p:sldId id="284" r:id="rId5"/>
-    <p:sldId id="285" r:id="rId6"/>
-    <p:sldId id="300" r:id="rId7"/>
-    <p:sldId id="286" r:id="rId8"/>
-    <p:sldId id="299" r:id="rId9"/>
-    <p:sldId id="298" r:id="rId10"/>
-    <p:sldId id="301" r:id="rId11"/>
-    <p:sldId id="287" r:id="rId12"/>
+    <p:sldId id="296" r:id="rId3"/>
+    <p:sldId id="284" r:id="rId4"/>
+    <p:sldId id="285" r:id="rId5"/>
+    <p:sldId id="300" r:id="rId6"/>
+    <p:sldId id="286" r:id="rId7"/>
+    <p:sldId id="299" r:id="rId8"/>
+    <p:sldId id="298" r:id="rId9"/>
+    <p:sldId id="301" r:id="rId10"/>
+    <p:sldId id="287" r:id="rId11"/>
   </p:sldIdLst>
   <p:sldSz cx="10972800" cy="6172200"/>
   <p:notesSz cx="6858000" cy="9144000"/>
@@ -212,7 +211,7 @@
           <p:cNvPr id="2" name="Header Placeholder 1">
             <a:extLst>
               <a:ext uri="{FF2B5EF4-FFF2-40B4-BE49-F238E27FC236}">
-                <a16:creationId xmlns:a16="http://schemas.microsoft.com/office/drawing/2014/main" id="{06F0C6CC-8512-447C-AEF6-49AA5B2EFDA5}"/>
+                <a16:creationId xmlns="" xmlns:a16="http://schemas.microsoft.com/office/drawing/2014/main" id="{06F0C6CC-8512-447C-AEF6-49AA5B2EFDA5}"/>
               </a:ext>
             </a:extLst>
           </p:cNvPr>
@@ -256,7 +255,7 @@
           <p:cNvPr id="3" name="Date Placeholder 2">
             <a:extLst>
               <a:ext uri="{FF2B5EF4-FFF2-40B4-BE49-F238E27FC236}">
-                <a16:creationId xmlns:a16="http://schemas.microsoft.com/office/drawing/2014/main" id="{CBE4B5AA-BEF6-4225-A645-F2F992753AF4}"/>
+                <a16:creationId xmlns="" xmlns:a16="http://schemas.microsoft.com/office/drawing/2014/main" id="{CBE4B5AA-BEF6-4225-A645-F2F992753AF4}"/>
               </a:ext>
             </a:extLst>
           </p:cNvPr>
@@ -296,7 +295,7 @@
               <a:pPr>
                 <a:defRPr/>
               </a:pPr>
-              <a:t>9/20/2017</a:t>
+              <a:t>9/21/2017</a:t>
             </a:fld>
             <a:endParaRPr lang="en-US" altLang="en-US"/>
           </a:p>
@@ -307,7 +306,7 @@
           <p:cNvPr id="4" name="Footer Placeholder 3">
             <a:extLst>
               <a:ext uri="{FF2B5EF4-FFF2-40B4-BE49-F238E27FC236}">
-                <a16:creationId xmlns:a16="http://schemas.microsoft.com/office/drawing/2014/main" id="{8F98A6F5-A5A7-41A2-BE05-C7EF039B7CED}"/>
+                <a16:creationId xmlns="" xmlns:a16="http://schemas.microsoft.com/office/drawing/2014/main" id="{8F98A6F5-A5A7-41A2-BE05-C7EF039B7CED}"/>
               </a:ext>
             </a:extLst>
           </p:cNvPr>
@@ -351,7 +350,7 @@
           <p:cNvPr id="5" name="Slide Number Placeholder 4">
             <a:extLst>
               <a:ext uri="{FF2B5EF4-FFF2-40B4-BE49-F238E27FC236}">
-                <a16:creationId xmlns:a16="http://schemas.microsoft.com/office/drawing/2014/main" id="{29A6D975-121D-485C-861C-454FD3FD7A60}"/>
+                <a16:creationId xmlns="" xmlns:a16="http://schemas.microsoft.com/office/drawing/2014/main" id="{29A6D975-121D-485C-861C-454FD3FD7A60}"/>
               </a:ext>
             </a:extLst>
           </p:cNvPr>
@@ -398,6 +397,11 @@
         </p:txBody>
       </p:sp>
     </p:spTree>
+    <p:extLst>
+      <p:ext uri="{BB962C8B-B14F-4D97-AF65-F5344CB8AC3E}">
+        <p14:creationId xmlns:p14="http://schemas.microsoft.com/office/powerpoint/2010/main" val="439417289"/>
+      </p:ext>
+    </p:extLst>
   </p:cSld>
   <p:clrMap bg1="lt1" tx1="dk1" bg2="lt2" tx2="dk2" accent1="accent1" accent2="accent2" accent3="accent3" accent4="accent4" accent5="accent5" accent6="accent6" hlink="hlink" folHlink="folHlink"/>
 </p:handoutMaster>
@@ -433,7 +437,7 @@
           <p:cNvPr id="8193" name="Rectangle 1">
             <a:extLst>
               <a:ext uri="{FF2B5EF4-FFF2-40B4-BE49-F238E27FC236}">
-                <a16:creationId xmlns:a16="http://schemas.microsoft.com/office/drawing/2014/main" id="{89C073E8-2ED4-4924-892E-53ED71D994BE}"/>
+                <a16:creationId xmlns="" xmlns:a16="http://schemas.microsoft.com/office/drawing/2014/main" id="{89C073E8-2ED4-4924-892E-53ED71D994BE}"/>
               </a:ext>
             </a:extLst>
           </p:cNvPr>
@@ -496,7 +500,7 @@
           <p:cNvPr id="8194" name="Rectangle 2">
             <a:extLst>
               <a:ext uri="{FF2B5EF4-FFF2-40B4-BE49-F238E27FC236}">
-                <a16:creationId xmlns:a16="http://schemas.microsoft.com/office/drawing/2014/main" id="{928B7E5E-B9D6-4255-A330-D8315FE2715B}"/>
+                <a16:creationId xmlns="" xmlns:a16="http://schemas.microsoft.com/office/drawing/2014/main" id="{928B7E5E-B9D6-4255-A330-D8315FE2715B}"/>
               </a:ext>
             </a:extLst>
           </p:cNvPr>
@@ -608,6 +612,11 @@
         </p:txBody>
       </p:sp>
     </p:spTree>
+    <p:extLst>
+      <p:ext uri="{BB962C8B-B14F-4D97-AF65-F5344CB8AC3E}">
+        <p14:creationId xmlns:p14="http://schemas.microsoft.com/office/powerpoint/2010/main" val="4091547449"/>
+      </p:ext>
+    </p:extLst>
   </p:cSld>
   <p:clrMap bg1="lt1" tx1="dk1" bg2="lt2" tx2="dk2" accent1="accent1" accent2="accent2" accent3="accent3" accent4="accent4" accent5="accent5" accent6="accent6" hlink="hlink" folHlink="folHlink"/>
   <p:notesStyle>
@@ -857,7 +866,7 @@
           <p:cNvPr id="4" name="Rectangle 4">
             <a:extLst>
               <a:ext uri="{FF2B5EF4-FFF2-40B4-BE49-F238E27FC236}">
-                <a16:creationId xmlns:a16="http://schemas.microsoft.com/office/drawing/2014/main" id="{C1772C76-9163-4025-839B-210AFAED49F9}"/>
+                <a16:creationId xmlns="" xmlns:a16="http://schemas.microsoft.com/office/drawing/2014/main" id="{C1772C76-9163-4025-839B-210AFAED49F9}"/>
               </a:ext>
             </a:extLst>
           </p:cNvPr>
@@ -1001,7 +1010,7 @@
           <p:cNvPr id="4" name="Rectangle 4">
             <a:extLst>
               <a:ext uri="{FF2B5EF4-FFF2-40B4-BE49-F238E27FC236}">
-                <a16:creationId xmlns:a16="http://schemas.microsoft.com/office/drawing/2014/main" id="{AD63CD7B-6B33-49EA-9E7B-4718B79E8166}"/>
+                <a16:creationId xmlns="" xmlns:a16="http://schemas.microsoft.com/office/drawing/2014/main" id="{AD63CD7B-6B33-49EA-9E7B-4718B79E8166}"/>
               </a:ext>
             </a:extLst>
           </p:cNvPr>
@@ -1155,7 +1164,7 @@
           <p:cNvPr id="4" name="Rectangle 4">
             <a:extLst>
               <a:ext uri="{FF2B5EF4-FFF2-40B4-BE49-F238E27FC236}">
-                <a16:creationId xmlns:a16="http://schemas.microsoft.com/office/drawing/2014/main" id="{DD385617-20A6-4DB5-9AC6-FDD79EEA161B}"/>
+                <a16:creationId xmlns="" xmlns:a16="http://schemas.microsoft.com/office/drawing/2014/main" id="{DD385617-20A6-4DB5-9AC6-FDD79EEA161B}"/>
               </a:ext>
             </a:extLst>
           </p:cNvPr>
@@ -1324,7 +1333,7 @@
           <p:cNvPr id="4" name="Rectangle 4">
             <a:extLst>
               <a:ext uri="{FF2B5EF4-FFF2-40B4-BE49-F238E27FC236}">
-                <a16:creationId xmlns:a16="http://schemas.microsoft.com/office/drawing/2014/main" id="{BE99BA93-8902-4C2F-A551-1B051A5BAAA0}"/>
+                <a16:creationId xmlns="" xmlns:a16="http://schemas.microsoft.com/office/drawing/2014/main" id="{BE99BA93-8902-4C2F-A551-1B051A5BAAA0}"/>
               </a:ext>
             </a:extLst>
           </p:cNvPr>
@@ -1476,7 +1485,7 @@
           <p:cNvPr id="4" name="Rectangle 4">
             <a:extLst>
               <a:ext uri="{FF2B5EF4-FFF2-40B4-BE49-F238E27FC236}">
-                <a16:creationId xmlns:a16="http://schemas.microsoft.com/office/drawing/2014/main" id="{AD978322-07CA-4380-8D1F-855EB73BC9AE}"/>
+                <a16:creationId xmlns="" xmlns:a16="http://schemas.microsoft.com/office/drawing/2014/main" id="{AD978322-07CA-4380-8D1F-855EB73BC9AE}"/>
               </a:ext>
             </a:extLst>
           </p:cNvPr>
@@ -1502,13 +1511,13 @@
               <a:defRPr/>
             </a:pPr>
             <a:fld id="{75F5B3A3-F04D-49B7-9A9F-969F228BCA8E}" type="slidenum">
-              <a:rPr lang="en-US" altLang="en-US"/>
+              <a:rPr lang="en-US" altLang="en-US" smtClean="0"/>
               <a:pPr>
                 <a:defRPr/>
               </a:pPr>
               <a:t>‹#›</a:t>
             </a:fld>
-            <a:endParaRPr lang="en-US" altLang="en-US"/>
+            <a:endParaRPr lang="en-US" altLang="en-US" dirty="0"/>
           </a:p>
         </p:txBody>
       </p:sp>
@@ -1646,7 +1655,7 @@
           <p:cNvPr id="4" name="Rectangle 4">
             <a:extLst>
               <a:ext uri="{FF2B5EF4-FFF2-40B4-BE49-F238E27FC236}">
-                <a16:creationId xmlns:a16="http://schemas.microsoft.com/office/drawing/2014/main" id="{F15B220C-1504-47B8-BEFD-08F6EDFB5595}"/>
+                <a16:creationId xmlns="" xmlns:a16="http://schemas.microsoft.com/office/drawing/2014/main" id="{F15B220C-1504-47B8-BEFD-08F6EDFB5595}"/>
               </a:ext>
             </a:extLst>
           </p:cNvPr>
@@ -1857,7 +1866,7 @@
           <p:cNvPr id="5" name="Rectangle 4">
             <a:extLst>
               <a:ext uri="{FF2B5EF4-FFF2-40B4-BE49-F238E27FC236}">
-                <a16:creationId xmlns:a16="http://schemas.microsoft.com/office/drawing/2014/main" id="{679B2FB5-8027-42E6-9970-E2B88D2EA44B}"/>
+                <a16:creationId xmlns="" xmlns:a16="http://schemas.microsoft.com/office/drawing/2014/main" id="{679B2FB5-8027-42E6-9970-E2B88D2EA44B}"/>
               </a:ext>
             </a:extLst>
           </p:cNvPr>
@@ -2209,7 +2218,7 @@
           <p:cNvPr id="7" name="Rectangle 4">
             <a:extLst>
               <a:ext uri="{FF2B5EF4-FFF2-40B4-BE49-F238E27FC236}">
-                <a16:creationId xmlns:a16="http://schemas.microsoft.com/office/drawing/2014/main" id="{27E73DEE-FF3E-4F30-84C0-9721F86E3F0B}"/>
+                <a16:creationId xmlns="" xmlns:a16="http://schemas.microsoft.com/office/drawing/2014/main" id="{27E73DEE-FF3E-4F30-84C0-9721F86E3F0B}"/>
               </a:ext>
             </a:extLst>
           </p:cNvPr>
@@ -2302,7 +2311,7 @@
           <p:cNvPr id="3" name="Rectangle 4">
             <a:extLst>
               <a:ext uri="{FF2B5EF4-FFF2-40B4-BE49-F238E27FC236}">
-                <a16:creationId xmlns:a16="http://schemas.microsoft.com/office/drawing/2014/main" id="{499FD4FC-E572-483A-B63D-20B0B630939E}"/>
+                <a16:creationId xmlns="" xmlns:a16="http://schemas.microsoft.com/office/drawing/2014/main" id="{499FD4FC-E572-483A-B63D-20B0B630939E}"/>
               </a:ext>
             </a:extLst>
           </p:cNvPr>
@@ -2373,7 +2382,7 @@
           <p:cNvPr id="2" name="Rectangle 4">
             <a:extLst>
               <a:ext uri="{FF2B5EF4-FFF2-40B4-BE49-F238E27FC236}">
-                <a16:creationId xmlns:a16="http://schemas.microsoft.com/office/drawing/2014/main" id="{D08EDA02-2D63-4992-8FC5-B2DEF17F3458}"/>
+                <a16:creationId xmlns="" xmlns:a16="http://schemas.microsoft.com/office/drawing/2014/main" id="{D08EDA02-2D63-4992-8FC5-B2DEF17F3458}"/>
               </a:ext>
             </a:extLst>
           </p:cNvPr>
@@ -2630,7 +2639,7 @@
           <p:cNvPr id="5" name="Rectangle 4">
             <a:extLst>
               <a:ext uri="{FF2B5EF4-FFF2-40B4-BE49-F238E27FC236}">
-                <a16:creationId xmlns:a16="http://schemas.microsoft.com/office/drawing/2014/main" id="{3EB11A92-F8D4-466C-B0C3-3F0F46AC70C7}"/>
+                <a16:creationId xmlns="" xmlns:a16="http://schemas.microsoft.com/office/drawing/2014/main" id="{3EB11A92-F8D4-466C-B0C3-3F0F46AC70C7}"/>
               </a:ext>
             </a:extLst>
           </p:cNvPr>
@@ -2774,7 +2783,7 @@
           <p:cNvPr id="4" name="Rectangle 4">
             <a:extLst>
               <a:ext uri="{FF2B5EF4-FFF2-40B4-BE49-F238E27FC236}">
-                <a16:creationId xmlns:a16="http://schemas.microsoft.com/office/drawing/2014/main" id="{2C4CB82D-CC2D-4A2D-A2F5-B58951949876}"/>
+                <a16:creationId xmlns="" xmlns:a16="http://schemas.microsoft.com/office/drawing/2014/main" id="{2C4CB82D-CC2D-4A2D-A2F5-B58951949876}"/>
               </a:ext>
             </a:extLst>
           </p:cNvPr>
@@ -3011,7 +3020,7 @@
           <p:cNvPr id="5" name="Rectangle 4">
             <a:extLst>
               <a:ext uri="{FF2B5EF4-FFF2-40B4-BE49-F238E27FC236}">
-                <a16:creationId xmlns:a16="http://schemas.microsoft.com/office/drawing/2014/main" id="{C5B3C5AA-BABD-4A0F-AB58-E3FB34A6A5FB}"/>
+                <a16:creationId xmlns="" xmlns:a16="http://schemas.microsoft.com/office/drawing/2014/main" id="{C5B3C5AA-BABD-4A0F-AB58-E3FB34A6A5FB}"/>
               </a:ext>
             </a:extLst>
           </p:cNvPr>
@@ -3163,7 +3172,7 @@
           <p:cNvPr id="4" name="Rectangle 4">
             <a:extLst>
               <a:ext uri="{FF2B5EF4-FFF2-40B4-BE49-F238E27FC236}">
-                <a16:creationId xmlns:a16="http://schemas.microsoft.com/office/drawing/2014/main" id="{C8397531-DF04-431B-86B4-1F6C0BB42F23}"/>
+                <a16:creationId xmlns="" xmlns:a16="http://schemas.microsoft.com/office/drawing/2014/main" id="{C8397531-DF04-431B-86B4-1F6C0BB42F23}"/>
               </a:ext>
             </a:extLst>
           </p:cNvPr>
@@ -3320,7 +3329,7 @@
           <p:cNvPr id="4" name="Rectangle 4">
             <a:extLst>
               <a:ext uri="{FF2B5EF4-FFF2-40B4-BE49-F238E27FC236}">
-                <a16:creationId xmlns:a16="http://schemas.microsoft.com/office/drawing/2014/main" id="{4940E61F-FC63-45E7-A52A-478C6FEF6C77}"/>
+                <a16:creationId xmlns="" xmlns:a16="http://schemas.microsoft.com/office/drawing/2014/main" id="{4940E61F-FC63-45E7-A52A-478C6FEF6C77}"/>
               </a:ext>
             </a:extLst>
           </p:cNvPr>
@@ -3487,7 +3496,7 @@
           <p:cNvPr id="4" name="Rectangle 4">
             <a:extLst>
               <a:ext uri="{FF2B5EF4-FFF2-40B4-BE49-F238E27FC236}">
-                <a16:creationId xmlns:a16="http://schemas.microsoft.com/office/drawing/2014/main" id="{CA5E6BC6-B1D6-4664-8917-51DFF0B684A2}"/>
+                <a16:creationId xmlns="" xmlns:a16="http://schemas.microsoft.com/office/drawing/2014/main" id="{CA5E6BC6-B1D6-4664-8917-51DFF0B684A2}"/>
               </a:ext>
             </a:extLst>
           </p:cNvPr>
@@ -3692,7 +3701,7 @@
           <p:cNvPr id="5" name="Rectangle 4">
             <a:extLst>
               <a:ext uri="{FF2B5EF4-FFF2-40B4-BE49-F238E27FC236}">
-                <a16:creationId xmlns:a16="http://schemas.microsoft.com/office/drawing/2014/main" id="{5B9FADCF-85AA-4C13-B9F8-C7DAEAADC9F0}"/>
+                <a16:creationId xmlns="" xmlns:a16="http://schemas.microsoft.com/office/drawing/2014/main" id="{5B9FADCF-85AA-4C13-B9F8-C7DAEAADC9F0}"/>
               </a:ext>
             </a:extLst>
           </p:cNvPr>
@@ -4032,7 +4041,7 @@
           <p:cNvPr id="7" name="Rectangle 4">
             <a:extLst>
               <a:ext uri="{FF2B5EF4-FFF2-40B4-BE49-F238E27FC236}">
-                <a16:creationId xmlns:a16="http://schemas.microsoft.com/office/drawing/2014/main" id="{FDE441DF-4966-405D-92F1-121F37682AE5}"/>
+                <a16:creationId xmlns="" xmlns:a16="http://schemas.microsoft.com/office/drawing/2014/main" id="{FDE441DF-4966-405D-92F1-121F37682AE5}"/>
               </a:ext>
             </a:extLst>
           </p:cNvPr>
@@ -4125,7 +4134,7 @@
           <p:cNvPr id="3" name="Rectangle 4">
             <a:extLst>
               <a:ext uri="{FF2B5EF4-FFF2-40B4-BE49-F238E27FC236}">
-                <a16:creationId xmlns:a16="http://schemas.microsoft.com/office/drawing/2014/main" id="{65B90BB3-81C2-4CBD-80E2-892B556C02DB}"/>
+                <a16:creationId xmlns="" xmlns:a16="http://schemas.microsoft.com/office/drawing/2014/main" id="{65B90BB3-81C2-4CBD-80E2-892B556C02DB}"/>
               </a:ext>
             </a:extLst>
           </p:cNvPr>
@@ -4196,7 +4205,7 @@
           <p:cNvPr id="2" name="Rectangle 4">
             <a:extLst>
               <a:ext uri="{FF2B5EF4-FFF2-40B4-BE49-F238E27FC236}">
-                <a16:creationId xmlns:a16="http://schemas.microsoft.com/office/drawing/2014/main" id="{DED817A2-D620-4376-B9D8-52CD208D6E46}"/>
+                <a16:creationId xmlns="" xmlns:a16="http://schemas.microsoft.com/office/drawing/2014/main" id="{DED817A2-D620-4376-B9D8-52CD208D6E46}"/>
               </a:ext>
             </a:extLst>
           </p:cNvPr>
@@ -4447,7 +4456,7 @@
           <p:cNvPr id="5" name="Rectangle 4">
             <a:extLst>
               <a:ext uri="{FF2B5EF4-FFF2-40B4-BE49-F238E27FC236}">
-                <a16:creationId xmlns:a16="http://schemas.microsoft.com/office/drawing/2014/main" id="{1FFEAFB6-234E-439B-985E-DEEF9877B71D}"/>
+                <a16:creationId xmlns="" xmlns:a16="http://schemas.microsoft.com/office/drawing/2014/main" id="{1FFEAFB6-234E-439B-985E-DEEF9877B71D}"/>
               </a:ext>
             </a:extLst>
           </p:cNvPr>
@@ -4678,7 +4687,7 @@
           <p:cNvPr id="5" name="Rectangle 4">
             <a:extLst>
               <a:ext uri="{FF2B5EF4-FFF2-40B4-BE49-F238E27FC236}">
-                <a16:creationId xmlns:a16="http://schemas.microsoft.com/office/drawing/2014/main" id="{FEFC0AEA-3BE6-45C9-8684-49E43B0AFD47}"/>
+                <a16:creationId xmlns="" xmlns:a16="http://schemas.microsoft.com/office/drawing/2014/main" id="{FEFC0AEA-3BE6-45C9-8684-49E43B0AFD47}"/>
               </a:ext>
             </a:extLst>
           </p:cNvPr>
@@ -4757,7 +4766,7 @@
           <p:cNvPr id="4097" name="AutoShape 1" descr="Parallelogram 17">
             <a:extLst>
               <a:ext uri="{FF2B5EF4-FFF2-40B4-BE49-F238E27FC236}">
-                <a16:creationId xmlns:a16="http://schemas.microsoft.com/office/drawing/2014/main" id="{A0F728BD-E019-46CC-BECE-E948AB08B46B}"/>
+                <a16:creationId xmlns="" xmlns:a16="http://schemas.microsoft.com/office/drawing/2014/main" id="{A0F728BD-E019-46CC-BECE-E948AB08B46B}"/>
               </a:ext>
             </a:extLst>
           </p:cNvPr>
@@ -4872,7 +4881,7 @@
           <p:cNvPr id="4098" name="Picture 2" descr="Picture 1">
             <a:extLst>
               <a:ext uri="{FF2B5EF4-FFF2-40B4-BE49-F238E27FC236}">
-                <a16:creationId xmlns:a16="http://schemas.microsoft.com/office/drawing/2014/main" id="{B65B282E-E18B-4AD7-8D89-748927E96FA2}"/>
+                <a16:creationId xmlns="" xmlns:a16="http://schemas.microsoft.com/office/drawing/2014/main" id="{B65B282E-E18B-4AD7-8D89-748927E96FA2}"/>
               </a:ext>
             </a:extLst>
           </p:cNvPr>
@@ -4945,7 +4954,7 @@
           <p:cNvPr id="4099" name="AutoShape 3" descr="Parallelogram 9">
             <a:extLst>
               <a:ext uri="{FF2B5EF4-FFF2-40B4-BE49-F238E27FC236}">
-                <a16:creationId xmlns:a16="http://schemas.microsoft.com/office/drawing/2014/main" id="{CE9D8836-DCB2-46F3-8931-C59F5485C7FA}"/>
+                <a16:creationId xmlns="" xmlns:a16="http://schemas.microsoft.com/office/drawing/2014/main" id="{CE9D8836-DCB2-46F3-8931-C59F5485C7FA}"/>
               </a:ext>
             </a:extLst>
           </p:cNvPr>
@@ -5060,7 +5069,7 @@
           <p:cNvPr id="4100" name="Rectangle 4">
             <a:extLst>
               <a:ext uri="{FF2B5EF4-FFF2-40B4-BE49-F238E27FC236}">
-                <a16:creationId xmlns:a16="http://schemas.microsoft.com/office/drawing/2014/main" id="{1E1E1FBC-67DD-4A12-BBA4-92D163704B42}"/>
+                <a16:creationId xmlns="" xmlns:a16="http://schemas.microsoft.com/office/drawing/2014/main" id="{1E1E1FBC-67DD-4A12-BBA4-92D163704B42}"/>
               </a:ext>
             </a:extLst>
           </p:cNvPr>
@@ -5156,7 +5165,7 @@
           <p:cNvPr id="4101" name="Picture 5" descr="Picture 2">
             <a:extLst>
               <a:ext uri="{FF2B5EF4-FFF2-40B4-BE49-F238E27FC236}">
-                <a16:creationId xmlns:a16="http://schemas.microsoft.com/office/drawing/2014/main" id="{2932FF9E-2464-4AE4-8F54-B65EED5E1352}"/>
+                <a16:creationId xmlns="" xmlns:a16="http://schemas.microsoft.com/office/drawing/2014/main" id="{2932FF9E-2464-4AE4-8F54-B65EED5E1352}"/>
               </a:ext>
             </a:extLst>
           </p:cNvPr>
@@ -5229,7 +5238,7 @@
           <p:cNvPr id="4102" name="Picture 6" descr="Picture 12">
             <a:extLst>
               <a:ext uri="{FF2B5EF4-FFF2-40B4-BE49-F238E27FC236}">
-                <a16:creationId xmlns:a16="http://schemas.microsoft.com/office/drawing/2014/main" id="{73C56F58-B4F6-4B25-92D0-5594F3269CDB}"/>
+                <a16:creationId xmlns="" xmlns:a16="http://schemas.microsoft.com/office/drawing/2014/main" id="{73C56F58-B4F6-4B25-92D0-5594F3269CDB}"/>
               </a:ext>
             </a:extLst>
           </p:cNvPr>
@@ -5302,7 +5311,7 @@
           <p:cNvPr id="4103" name="Line 7" descr="Straight Connector 7">
             <a:extLst>
               <a:ext uri="{FF2B5EF4-FFF2-40B4-BE49-F238E27FC236}">
-                <a16:creationId xmlns:a16="http://schemas.microsoft.com/office/drawing/2014/main" id="{984828E0-3FC9-42FA-AA3D-12315A45E3E7}"/>
+                <a16:creationId xmlns="" xmlns:a16="http://schemas.microsoft.com/office/drawing/2014/main" id="{984828E0-3FC9-42FA-AA3D-12315A45E3E7}"/>
               </a:ext>
             </a:extLst>
           </p:cNvPr>
@@ -5373,7 +5382,7 @@
           <p:cNvPr id="4104" name="Line 8" descr="Straight Connector 14">
             <a:extLst>
               <a:ext uri="{FF2B5EF4-FFF2-40B4-BE49-F238E27FC236}">
-                <a16:creationId xmlns:a16="http://schemas.microsoft.com/office/drawing/2014/main" id="{562B27C6-5979-4335-9597-FB9DD533E7F6}"/>
+                <a16:creationId xmlns="" xmlns:a16="http://schemas.microsoft.com/office/drawing/2014/main" id="{562B27C6-5979-4335-9597-FB9DD533E7F6}"/>
               </a:ext>
             </a:extLst>
           </p:cNvPr>
@@ -5444,7 +5453,7 @@
           <p:cNvPr id="4105" name="Line 9" descr="Straight Connector 16">
             <a:extLst>
               <a:ext uri="{FF2B5EF4-FFF2-40B4-BE49-F238E27FC236}">
-                <a16:creationId xmlns:a16="http://schemas.microsoft.com/office/drawing/2014/main" id="{4B63E25F-AACD-427B-9E7A-A6F06D0F351F}"/>
+                <a16:creationId xmlns="" xmlns:a16="http://schemas.microsoft.com/office/drawing/2014/main" id="{4B63E25F-AACD-427B-9E7A-A6F06D0F351F}"/>
               </a:ext>
             </a:extLst>
           </p:cNvPr>
@@ -5515,7 +5524,7 @@
           <p:cNvPr id="4106" name="Line 10" descr="Straight Connector 15">
             <a:extLst>
               <a:ext uri="{FF2B5EF4-FFF2-40B4-BE49-F238E27FC236}">
-                <a16:creationId xmlns:a16="http://schemas.microsoft.com/office/drawing/2014/main" id="{EE53E246-CE56-4A0B-8AAC-851AF6302BE6}"/>
+                <a16:creationId xmlns="" xmlns:a16="http://schemas.microsoft.com/office/drawing/2014/main" id="{EE53E246-CE56-4A0B-8AAC-851AF6302BE6}"/>
               </a:ext>
             </a:extLst>
           </p:cNvPr>
@@ -5586,7 +5595,7 @@
           <p:cNvPr id="4107" name="Picture 11" descr="Picture 4">
             <a:extLst>
               <a:ext uri="{FF2B5EF4-FFF2-40B4-BE49-F238E27FC236}">
-                <a16:creationId xmlns:a16="http://schemas.microsoft.com/office/drawing/2014/main" id="{84A5AA87-B2FF-430A-B8C7-D88CBDBC8B5A}"/>
+                <a16:creationId xmlns="" xmlns:a16="http://schemas.microsoft.com/office/drawing/2014/main" id="{84A5AA87-B2FF-430A-B8C7-D88CBDBC8B5A}"/>
               </a:ext>
             </a:extLst>
           </p:cNvPr>
@@ -5659,7 +5668,7 @@
           <p:cNvPr id="4108" name="Rectangle 12">
             <a:extLst>
               <a:ext uri="{FF2B5EF4-FFF2-40B4-BE49-F238E27FC236}">
-                <a16:creationId xmlns:a16="http://schemas.microsoft.com/office/drawing/2014/main" id="{F29512A2-9A0F-4FA4-A1EB-02A95A907C83}"/>
+                <a16:creationId xmlns="" xmlns:a16="http://schemas.microsoft.com/office/drawing/2014/main" id="{F29512A2-9A0F-4FA4-A1EB-02A95A907C83}"/>
               </a:ext>
             </a:extLst>
           </p:cNvPr>
@@ -5739,7 +5748,7 @@
           <p:cNvPr id="4109" name="Rectangle 13">
             <a:extLst>
               <a:ext uri="{FF2B5EF4-FFF2-40B4-BE49-F238E27FC236}">
-                <a16:creationId xmlns:a16="http://schemas.microsoft.com/office/drawing/2014/main" id="{417E89E3-0AD9-49C6-A852-573F8D4598D7}"/>
+                <a16:creationId xmlns="" xmlns:a16="http://schemas.microsoft.com/office/drawing/2014/main" id="{417E89E3-0AD9-49C6-A852-573F8D4598D7}"/>
               </a:ext>
             </a:extLst>
           </p:cNvPr>
@@ -6382,7 +6391,7 @@
           <p:cNvPr id="5121" name="AutoShape 1" descr="Parallelogram 17">
             <a:extLst>
               <a:ext uri="{FF2B5EF4-FFF2-40B4-BE49-F238E27FC236}">
-                <a16:creationId xmlns:a16="http://schemas.microsoft.com/office/drawing/2014/main" id="{C57FFF03-3859-4AD5-BFF7-8CD6CB10C314}"/>
+                <a16:creationId xmlns="" xmlns:a16="http://schemas.microsoft.com/office/drawing/2014/main" id="{C57FFF03-3859-4AD5-BFF7-8CD6CB10C314}"/>
               </a:ext>
             </a:extLst>
           </p:cNvPr>
@@ -6497,7 +6506,7 @@
           <p:cNvPr id="5122" name="Picture 2" descr="Picture 1">
             <a:extLst>
               <a:ext uri="{FF2B5EF4-FFF2-40B4-BE49-F238E27FC236}">
-                <a16:creationId xmlns:a16="http://schemas.microsoft.com/office/drawing/2014/main" id="{7F6976F3-7A0F-4CDD-9CA4-8336FF96B46E}"/>
+                <a16:creationId xmlns="" xmlns:a16="http://schemas.microsoft.com/office/drawing/2014/main" id="{7F6976F3-7A0F-4CDD-9CA4-8336FF96B46E}"/>
               </a:ext>
             </a:extLst>
           </p:cNvPr>
@@ -6570,7 +6579,7 @@
           <p:cNvPr id="5123" name="AutoShape 3" descr="Parallelogram 9">
             <a:extLst>
               <a:ext uri="{FF2B5EF4-FFF2-40B4-BE49-F238E27FC236}">
-                <a16:creationId xmlns:a16="http://schemas.microsoft.com/office/drawing/2014/main" id="{67719731-A70D-4566-97A2-3857E6661F46}"/>
+                <a16:creationId xmlns="" xmlns:a16="http://schemas.microsoft.com/office/drawing/2014/main" id="{67719731-A70D-4566-97A2-3857E6661F46}"/>
               </a:ext>
             </a:extLst>
           </p:cNvPr>
@@ -6685,7 +6694,7 @@
           <p:cNvPr id="5124" name="Rectangle 4">
             <a:extLst>
               <a:ext uri="{FF2B5EF4-FFF2-40B4-BE49-F238E27FC236}">
-                <a16:creationId xmlns:a16="http://schemas.microsoft.com/office/drawing/2014/main" id="{F33965A9-CCBB-4495-8863-E5FCDE58C738}"/>
+                <a16:creationId xmlns="" xmlns:a16="http://schemas.microsoft.com/office/drawing/2014/main" id="{F33965A9-CCBB-4495-8863-E5FCDE58C738}"/>
               </a:ext>
             </a:extLst>
           </p:cNvPr>
@@ -6781,7 +6790,7 @@
           <p:cNvPr id="5125" name="Picture 5" descr="Picture 2">
             <a:extLst>
               <a:ext uri="{FF2B5EF4-FFF2-40B4-BE49-F238E27FC236}">
-                <a16:creationId xmlns:a16="http://schemas.microsoft.com/office/drawing/2014/main" id="{2043E28B-B0B2-4D5D-AACF-CD3A24362F7B}"/>
+                <a16:creationId xmlns="" xmlns:a16="http://schemas.microsoft.com/office/drawing/2014/main" id="{2043E28B-B0B2-4D5D-AACF-CD3A24362F7B}"/>
               </a:ext>
             </a:extLst>
           </p:cNvPr>
@@ -6854,7 +6863,7 @@
           <p:cNvPr id="5126" name="Picture 6" descr="Picture 12">
             <a:extLst>
               <a:ext uri="{FF2B5EF4-FFF2-40B4-BE49-F238E27FC236}">
-                <a16:creationId xmlns:a16="http://schemas.microsoft.com/office/drawing/2014/main" id="{AF39F44D-42C0-467A-96B9-CBB7BBABA8A9}"/>
+                <a16:creationId xmlns="" xmlns:a16="http://schemas.microsoft.com/office/drawing/2014/main" id="{AF39F44D-42C0-467A-96B9-CBB7BBABA8A9}"/>
               </a:ext>
             </a:extLst>
           </p:cNvPr>
@@ -6927,7 +6936,7 @@
           <p:cNvPr id="5127" name="Line 7" descr="Straight Connector 7">
             <a:extLst>
               <a:ext uri="{FF2B5EF4-FFF2-40B4-BE49-F238E27FC236}">
-                <a16:creationId xmlns:a16="http://schemas.microsoft.com/office/drawing/2014/main" id="{DCD507D7-88DD-4B24-A9AE-52F5F661FF6A}"/>
+                <a16:creationId xmlns="" xmlns:a16="http://schemas.microsoft.com/office/drawing/2014/main" id="{DCD507D7-88DD-4B24-A9AE-52F5F661FF6A}"/>
               </a:ext>
             </a:extLst>
           </p:cNvPr>
@@ -6998,7 +7007,7 @@
           <p:cNvPr id="5128" name="Line 8" descr="Straight Connector 14">
             <a:extLst>
               <a:ext uri="{FF2B5EF4-FFF2-40B4-BE49-F238E27FC236}">
-                <a16:creationId xmlns:a16="http://schemas.microsoft.com/office/drawing/2014/main" id="{C8A80AB0-0197-49D9-8930-142B6CF18DD1}"/>
+                <a16:creationId xmlns="" xmlns:a16="http://schemas.microsoft.com/office/drawing/2014/main" id="{C8A80AB0-0197-49D9-8930-142B6CF18DD1}"/>
               </a:ext>
             </a:extLst>
           </p:cNvPr>
@@ -7069,7 +7078,7 @@
           <p:cNvPr id="5129" name="Line 9" descr="Straight Connector 16">
             <a:extLst>
               <a:ext uri="{FF2B5EF4-FFF2-40B4-BE49-F238E27FC236}">
-                <a16:creationId xmlns:a16="http://schemas.microsoft.com/office/drawing/2014/main" id="{F50927A4-33B6-43A4-AEF0-2277C6E52164}"/>
+                <a16:creationId xmlns="" xmlns:a16="http://schemas.microsoft.com/office/drawing/2014/main" id="{F50927A4-33B6-43A4-AEF0-2277C6E52164}"/>
               </a:ext>
             </a:extLst>
           </p:cNvPr>
@@ -7140,7 +7149,7 @@
           <p:cNvPr id="5130" name="Line 10" descr="Straight Connector 15">
             <a:extLst>
               <a:ext uri="{FF2B5EF4-FFF2-40B4-BE49-F238E27FC236}">
-                <a16:creationId xmlns:a16="http://schemas.microsoft.com/office/drawing/2014/main" id="{4815005B-698E-4E1B-8C91-58C1AD8D6FE3}"/>
+                <a16:creationId xmlns="" xmlns:a16="http://schemas.microsoft.com/office/drawing/2014/main" id="{4815005B-698E-4E1B-8C91-58C1AD8D6FE3}"/>
               </a:ext>
             </a:extLst>
           </p:cNvPr>
@@ -7211,7 +7220,7 @@
           <p:cNvPr id="5131" name="Picture 11" descr="Picture 4">
             <a:extLst>
               <a:ext uri="{FF2B5EF4-FFF2-40B4-BE49-F238E27FC236}">
-                <a16:creationId xmlns:a16="http://schemas.microsoft.com/office/drawing/2014/main" id="{FC5AFC0B-1DB2-48FB-99B2-3B72290107E1}"/>
+                <a16:creationId xmlns="" xmlns:a16="http://schemas.microsoft.com/office/drawing/2014/main" id="{FC5AFC0B-1DB2-48FB-99B2-3B72290107E1}"/>
               </a:ext>
             </a:extLst>
           </p:cNvPr>
@@ -7284,7 +7293,7 @@
           <p:cNvPr id="5132" name="Rectangle 12">
             <a:extLst>
               <a:ext uri="{FF2B5EF4-FFF2-40B4-BE49-F238E27FC236}">
-                <a16:creationId xmlns:a16="http://schemas.microsoft.com/office/drawing/2014/main" id="{22A2BE63-4A07-4904-B8AC-693ABAFA65C9}"/>
+                <a16:creationId xmlns="" xmlns:a16="http://schemas.microsoft.com/office/drawing/2014/main" id="{22A2BE63-4A07-4904-B8AC-693ABAFA65C9}"/>
               </a:ext>
             </a:extLst>
           </p:cNvPr>
@@ -7880,653 +7889,10 @@
       </p:grpSpPr>
       <p:sp>
         <p:nvSpPr>
-          <p:cNvPr id="46081" name="Text Box 1" descr="TextBox 11">
-            <a:extLst>
-              <a:ext uri="{FF2B5EF4-FFF2-40B4-BE49-F238E27FC236}">
-                <a16:creationId xmlns:a16="http://schemas.microsoft.com/office/drawing/2014/main" id="{D3333DAE-9649-4C45-A14A-695CF7F930FA}"/>
-              </a:ext>
-            </a:extLst>
-          </p:cNvPr>
-          <p:cNvSpPr txBox="1">
-            <a:spLocks/>
-          </p:cNvSpPr>
-          <p:nvPr/>
-        </p:nvSpPr>
-        <p:spPr bwMode="auto">
-          <a:xfrm>
-            <a:off x="582613" y="6018213"/>
-            <a:ext cx="127000" cy="127000"/>
-          </a:xfrm>
-          <a:prstGeom prst="rect">
-            <a:avLst/>
-          </a:prstGeom>
-          <a:noFill/>
-          <a:ln>
-            <a:noFill/>
-          </a:ln>
-          <a:effectLst/>
-          <a:extLst>
-            <a:ext uri="{909E8E84-426E-40DD-AFC4-6F175D3DCCD1}">
-              <a14:hiddenFill xmlns:a14="http://schemas.microsoft.com/office/drawing/2010/main">
-                <a:solidFill>
-                  <a:srgbClr val="FFFFFF"/>
-                </a:solidFill>
-              </a14:hiddenFill>
-            </a:ext>
-            <a:ext uri="{91240B29-F687-4F45-9708-019B960494DF}">
-              <a14:hiddenLine xmlns:a14="http://schemas.microsoft.com/office/drawing/2010/main" w="12700" cap="flat" cmpd="sng">
-                <a:solidFill>
-                  <a:srgbClr val="000000"/>
-                </a:solidFill>
-                <a:prstDash val="solid"/>
-                <a:miter lim="400000"/>
-                <a:headEnd type="none" w="med" len="med"/>
-                <a:tailEnd type="none" w="med" len="med"/>
-              </a14:hiddenLine>
-            </a:ext>
-            <a:ext uri="{AF507438-7753-43E0-B8FC-AC1667EBCBE1}">
-              <a14:hiddenEffects xmlns:a14="http://schemas.microsoft.com/office/drawing/2010/main">
-                <a:effectLst>
-                  <a:outerShdw blurRad="63500" dist="38099" dir="2700000" algn="ctr" rotWithShape="0">
-                    <a:srgbClr val="000000">
-                      <a:alpha val="74998"/>
-                    </a:srgbClr>
-                  </a:outerShdw>
-                </a:effectLst>
-              </a14:hiddenEffects>
-            </a:ext>
-          </a:extLst>
-        </p:spPr>
-        <p:txBody>
-          <a:bodyPr wrap="none" lIns="0" tIns="0" rIns="0" bIns="0" anchor="ctr">
-            <a:spAutoFit/>
-          </a:bodyPr>
-          <a:lstStyle>
-            <a:lvl1pPr>
-              <a:defRPr>
-                <a:solidFill>
-                  <a:srgbClr val="6F6F6F"/>
-                </a:solidFill>
-                <a:latin typeface="Trebuchet MS" panose="020B0603020202020204" pitchFamily="34" charset="0"/>
-                <a:ea typeface="Trebuchet MS" panose="020B0603020202020204" pitchFamily="34" charset="0"/>
-                <a:cs typeface="Trebuchet MS" panose="020B0603020202020204" pitchFamily="34" charset="0"/>
-                <a:sym typeface="Trebuchet MS" panose="020B0603020202020204" pitchFamily="34" charset="0"/>
-              </a:defRPr>
-            </a:lvl1pPr>
-            <a:lvl2pPr marL="742950" indent="-285750">
-              <a:defRPr>
-                <a:solidFill>
-                  <a:srgbClr val="6F6F6F"/>
-                </a:solidFill>
-                <a:latin typeface="Trebuchet MS" panose="020B0603020202020204" pitchFamily="34" charset="0"/>
-                <a:ea typeface="Trebuchet MS" panose="020B0603020202020204" pitchFamily="34" charset="0"/>
-                <a:cs typeface="Trebuchet MS" panose="020B0603020202020204" pitchFamily="34" charset="0"/>
-                <a:sym typeface="Trebuchet MS" panose="020B0603020202020204" pitchFamily="34" charset="0"/>
-              </a:defRPr>
-            </a:lvl2pPr>
-            <a:lvl3pPr marL="1143000" indent="-228600">
-              <a:defRPr>
-                <a:solidFill>
-                  <a:srgbClr val="6F6F6F"/>
-                </a:solidFill>
-                <a:latin typeface="Trebuchet MS" panose="020B0603020202020204" pitchFamily="34" charset="0"/>
-                <a:ea typeface="Trebuchet MS" panose="020B0603020202020204" pitchFamily="34" charset="0"/>
-                <a:cs typeface="Trebuchet MS" panose="020B0603020202020204" pitchFamily="34" charset="0"/>
-                <a:sym typeface="Trebuchet MS" panose="020B0603020202020204" pitchFamily="34" charset="0"/>
-              </a:defRPr>
-            </a:lvl3pPr>
-            <a:lvl4pPr marL="1600200" indent="-228600">
-              <a:defRPr>
-                <a:solidFill>
-                  <a:srgbClr val="6F6F6F"/>
-                </a:solidFill>
-                <a:latin typeface="Trebuchet MS" panose="020B0603020202020204" pitchFamily="34" charset="0"/>
-                <a:ea typeface="Trebuchet MS" panose="020B0603020202020204" pitchFamily="34" charset="0"/>
-                <a:cs typeface="Trebuchet MS" panose="020B0603020202020204" pitchFamily="34" charset="0"/>
-                <a:sym typeface="Trebuchet MS" panose="020B0603020202020204" pitchFamily="34" charset="0"/>
-              </a:defRPr>
-            </a:lvl4pPr>
-            <a:lvl5pPr marL="2057400" indent="-228600">
-              <a:defRPr>
-                <a:solidFill>
-                  <a:srgbClr val="6F6F6F"/>
-                </a:solidFill>
-                <a:latin typeface="Trebuchet MS" panose="020B0603020202020204" pitchFamily="34" charset="0"/>
-                <a:ea typeface="Trebuchet MS" panose="020B0603020202020204" pitchFamily="34" charset="0"/>
-                <a:cs typeface="Trebuchet MS" panose="020B0603020202020204" pitchFamily="34" charset="0"/>
-                <a:sym typeface="Trebuchet MS" panose="020B0603020202020204" pitchFamily="34" charset="0"/>
-              </a:defRPr>
-            </a:lvl5pPr>
-            <a:lvl6pPr marL="2514600" indent="-228600" defTabSz="457200" eaLnBrk="0" fontAlgn="base" hangingPunct="0">
-              <a:spcBef>
-                <a:spcPct val="0"/>
-              </a:spcBef>
-              <a:spcAft>
-                <a:spcPct val="0"/>
-              </a:spcAft>
-              <a:defRPr>
-                <a:solidFill>
-                  <a:srgbClr val="6F6F6F"/>
-                </a:solidFill>
-                <a:latin typeface="Trebuchet MS" panose="020B0603020202020204" pitchFamily="34" charset="0"/>
-                <a:ea typeface="Trebuchet MS" panose="020B0603020202020204" pitchFamily="34" charset="0"/>
-                <a:cs typeface="Trebuchet MS" panose="020B0603020202020204" pitchFamily="34" charset="0"/>
-                <a:sym typeface="Trebuchet MS" panose="020B0603020202020204" pitchFamily="34" charset="0"/>
-              </a:defRPr>
-            </a:lvl6pPr>
-            <a:lvl7pPr marL="2971800" indent="-228600" defTabSz="457200" eaLnBrk="0" fontAlgn="base" hangingPunct="0">
-              <a:spcBef>
-                <a:spcPct val="0"/>
-              </a:spcBef>
-              <a:spcAft>
-                <a:spcPct val="0"/>
-              </a:spcAft>
-              <a:defRPr>
-                <a:solidFill>
-                  <a:srgbClr val="6F6F6F"/>
-                </a:solidFill>
-                <a:latin typeface="Trebuchet MS" panose="020B0603020202020204" pitchFamily="34" charset="0"/>
-                <a:ea typeface="Trebuchet MS" panose="020B0603020202020204" pitchFamily="34" charset="0"/>
-                <a:cs typeface="Trebuchet MS" panose="020B0603020202020204" pitchFamily="34" charset="0"/>
-                <a:sym typeface="Trebuchet MS" panose="020B0603020202020204" pitchFamily="34" charset="0"/>
-              </a:defRPr>
-            </a:lvl7pPr>
-            <a:lvl8pPr marL="3429000" indent="-228600" defTabSz="457200" eaLnBrk="0" fontAlgn="base" hangingPunct="0">
-              <a:spcBef>
-                <a:spcPct val="0"/>
-              </a:spcBef>
-              <a:spcAft>
-                <a:spcPct val="0"/>
-              </a:spcAft>
-              <a:defRPr>
-                <a:solidFill>
-                  <a:srgbClr val="6F6F6F"/>
-                </a:solidFill>
-                <a:latin typeface="Trebuchet MS" panose="020B0603020202020204" pitchFamily="34" charset="0"/>
-                <a:ea typeface="Trebuchet MS" panose="020B0603020202020204" pitchFamily="34" charset="0"/>
-                <a:cs typeface="Trebuchet MS" panose="020B0603020202020204" pitchFamily="34" charset="0"/>
-                <a:sym typeface="Trebuchet MS" panose="020B0603020202020204" pitchFamily="34" charset="0"/>
-              </a:defRPr>
-            </a:lvl8pPr>
-            <a:lvl9pPr marL="3886200" indent="-228600" defTabSz="457200" eaLnBrk="0" fontAlgn="base" hangingPunct="0">
-              <a:spcBef>
-                <a:spcPct val="0"/>
-              </a:spcBef>
-              <a:spcAft>
-                <a:spcPct val="0"/>
-              </a:spcAft>
-              <a:defRPr>
-                <a:solidFill>
-                  <a:srgbClr val="6F6F6F"/>
-                </a:solidFill>
-                <a:latin typeface="Trebuchet MS" panose="020B0603020202020204" pitchFamily="34" charset="0"/>
-                <a:ea typeface="Trebuchet MS" panose="020B0603020202020204" pitchFamily="34" charset="0"/>
-                <a:cs typeface="Trebuchet MS" panose="020B0603020202020204" pitchFamily="34" charset="0"/>
-                <a:sym typeface="Trebuchet MS" panose="020B0603020202020204" pitchFamily="34" charset="0"/>
-              </a:defRPr>
-            </a:lvl9pPr>
-          </a:lstStyle>
-          <a:p>
-            <a:pPr eaLnBrk="1">
-              <a:defRPr/>
-            </a:pPr>
-            <a:fld id="{6304A6CE-B792-4DA8-B4C9-464FACA7E5B1}" type="slidenum">
-              <a:rPr lang="en-US" altLang="en-US" sz="600" smtClean="0">
-                <a:solidFill>
-                  <a:srgbClr val="FFFFFF"/>
-                </a:solidFill>
-                <a:latin typeface="Arial" panose="020B0604020202020204" pitchFamily="34" charset="0"/>
-                <a:cs typeface="Arial" panose="020B0604020202020204" pitchFamily="34" charset="0"/>
-                <a:sym typeface="Arial" panose="020B0604020202020204" pitchFamily="34" charset="0"/>
-              </a:rPr>
-              <a:pPr eaLnBrk="1">
-                <a:defRPr/>
-              </a:pPr>
-              <a:t>1</a:t>
-            </a:fld>
-            <a:endParaRPr lang="en-US" altLang="en-US" sz="600">
-              <a:solidFill>
-                <a:srgbClr val="FFFFFF"/>
-              </a:solidFill>
-              <a:latin typeface="Arial" panose="020B0604020202020204" pitchFamily="34" charset="0"/>
-              <a:cs typeface="Arial" panose="020B0604020202020204" pitchFamily="34" charset="0"/>
-              <a:sym typeface="Arial" panose="020B0604020202020204" pitchFamily="34" charset="0"/>
-            </a:endParaRPr>
-          </a:p>
-        </p:txBody>
-      </p:sp>
-      <p:sp>
-        <p:nvSpPr>
-          <p:cNvPr id="46082" name="Text Box 2" descr="Shape 499">
-            <a:extLst>
-              <a:ext uri="{FF2B5EF4-FFF2-40B4-BE49-F238E27FC236}">
-                <a16:creationId xmlns:a16="http://schemas.microsoft.com/office/drawing/2014/main" id="{1C032A2A-B356-40E6-8F5B-90C2B588F5F3}"/>
-              </a:ext>
-            </a:extLst>
-          </p:cNvPr>
-          <p:cNvSpPr txBox="1">
-            <a:spLocks/>
-          </p:cNvSpPr>
-          <p:nvPr/>
-        </p:nvSpPr>
-        <p:spPr bwMode="auto">
-          <a:xfrm>
-            <a:off x="2349500" y="1052513"/>
-            <a:ext cx="5897563" cy="3681412"/>
-          </a:xfrm>
-          <a:prstGeom prst="rect">
-            <a:avLst/>
-          </a:prstGeom>
-          <a:noFill/>
-          <a:ln>
-            <a:noFill/>
-          </a:ln>
-          <a:effectLst/>
-          <a:extLst>
-            <a:ext uri="{909E8E84-426E-40DD-AFC4-6F175D3DCCD1}">
-              <a14:hiddenFill xmlns:a14="http://schemas.microsoft.com/office/drawing/2010/main">
-                <a:solidFill>
-                  <a:srgbClr val="FFFFFF"/>
-                </a:solidFill>
-              </a14:hiddenFill>
-            </a:ext>
-            <a:ext uri="{91240B29-F687-4F45-9708-019B960494DF}">
-              <a14:hiddenLine xmlns:a14="http://schemas.microsoft.com/office/drawing/2010/main" w="12700" cap="flat" cmpd="sng">
-                <a:solidFill>
-                  <a:srgbClr val="000000"/>
-                </a:solidFill>
-                <a:prstDash val="solid"/>
-                <a:miter lim="400000"/>
-                <a:headEnd type="none" w="med" len="med"/>
-                <a:tailEnd type="none" w="med" len="med"/>
-              </a14:hiddenLine>
-            </a:ext>
-            <a:ext uri="{AF507438-7753-43E0-B8FC-AC1667EBCBE1}">
-              <a14:hiddenEffects xmlns:a14="http://schemas.microsoft.com/office/drawing/2010/main">
-                <a:effectLst>
-                  <a:outerShdw blurRad="63500" dist="38099" dir="2700000" algn="ctr" rotWithShape="0">
-                    <a:srgbClr val="000000">
-                      <a:alpha val="74998"/>
-                    </a:srgbClr>
-                  </a:outerShdw>
-                </a:effectLst>
-              </a14:hiddenEffects>
-            </a:ext>
-          </a:extLst>
-        </p:spPr>
-        <p:txBody>
-          <a:bodyPr lIns="45718" tIns="45718" rIns="45718" bIns="45718" anchor="ctr"/>
-          <a:lstStyle/>
-          <a:p>
-            <a:pPr eaLnBrk="1">
-              <a:lnSpc>
-                <a:spcPct val="90000"/>
-              </a:lnSpc>
-              <a:defRPr/>
-            </a:pPr>
-            <a:r>
-              <a:rPr lang="x-none" altLang="x-none" sz="5100">
-                <a:solidFill>
-                  <a:srgbClr val="000000"/>
-                </a:solidFill>
-                <a:latin typeface="Arial" charset="0"/>
-                <a:ea typeface="Arial" charset="0"/>
-                <a:cs typeface="Arial" charset="0"/>
-                <a:sym typeface="Arial" charset="0"/>
-              </a:rPr>
-              <a:t>Accuracy, Speed and Interpretability</a:t>
-            </a:r>
-          </a:p>
-        </p:txBody>
-      </p:sp>
-    </p:spTree>
-  </p:cSld>
-  <p:clrMapOvr>
-    <a:masterClrMapping/>
-  </p:clrMapOvr>
-  <p:transition spd="med"/>
-</p:sld>
-</file>
-
-<file path=ppt/slides/slide10.xml><?xml version="1.0" encoding="utf-8"?>
-<p:sld xmlns:a="http://schemas.openxmlformats.org/drawingml/2006/main" xmlns:r="http://schemas.openxmlformats.org/officeDocument/2006/relationships" xmlns:p="http://schemas.openxmlformats.org/presentationml/2006/main">
-  <p:cSld>
-    <p:spTree>
-      <p:nvGrpSpPr>
-        <p:cNvPr id="1" name=""/>
-        <p:cNvGrpSpPr/>
-        <p:nvPr/>
-      </p:nvGrpSpPr>
-      <p:grpSpPr>
-        <a:xfrm>
-          <a:off x="0" y="0"/>
-          <a:ext cx="0" cy="0"/>
-          <a:chOff x="0" y="0"/>
-          <a:chExt cx="0" cy="0"/>
-        </a:xfrm>
-      </p:grpSpPr>
-      <p:sp>
-        <p:nvSpPr>
-          <p:cNvPr id="50177" name="Text Box 1" descr="TextBox 11">
-            <a:extLst>
-              <a:ext uri="{FF2B5EF4-FFF2-40B4-BE49-F238E27FC236}">
-                <a16:creationId xmlns:a16="http://schemas.microsoft.com/office/drawing/2014/main" id="{9BB845AC-699F-4EB2-B34D-6C555ECA4309}"/>
-              </a:ext>
-            </a:extLst>
-          </p:cNvPr>
-          <p:cNvSpPr txBox="1">
-            <a:spLocks/>
-          </p:cNvSpPr>
-          <p:nvPr/>
-        </p:nvSpPr>
-        <p:spPr bwMode="auto">
-          <a:xfrm>
-            <a:off x="582613" y="6018213"/>
-            <a:ext cx="127000" cy="127000"/>
-          </a:xfrm>
-          <a:prstGeom prst="rect">
-            <a:avLst/>
-          </a:prstGeom>
-          <a:noFill/>
-          <a:ln>
-            <a:noFill/>
-          </a:ln>
-          <a:effectLst/>
-          <a:extLst>
-            <a:ext uri="{909E8E84-426E-40DD-AFC4-6F175D3DCCD1}">
-              <a14:hiddenFill xmlns:a14="http://schemas.microsoft.com/office/drawing/2010/main">
-                <a:solidFill>
-                  <a:srgbClr val="FFFFFF"/>
-                </a:solidFill>
-              </a14:hiddenFill>
-            </a:ext>
-            <a:ext uri="{91240B29-F687-4F45-9708-019B960494DF}">
-              <a14:hiddenLine xmlns:a14="http://schemas.microsoft.com/office/drawing/2010/main" w="12700" cap="flat" cmpd="sng">
-                <a:solidFill>
-                  <a:srgbClr val="000000"/>
-                </a:solidFill>
-                <a:prstDash val="solid"/>
-                <a:miter lim="400000"/>
-                <a:headEnd type="none" w="med" len="med"/>
-                <a:tailEnd type="none" w="med" len="med"/>
-              </a14:hiddenLine>
-            </a:ext>
-            <a:ext uri="{AF507438-7753-43E0-B8FC-AC1667EBCBE1}">
-              <a14:hiddenEffects xmlns:a14="http://schemas.microsoft.com/office/drawing/2010/main">
-                <a:effectLst>
-                  <a:outerShdw blurRad="63500" dist="38099" dir="2700000" algn="ctr" rotWithShape="0">
-                    <a:srgbClr val="000000">
-                      <a:alpha val="74998"/>
-                    </a:srgbClr>
-                  </a:outerShdw>
-                </a:effectLst>
-              </a14:hiddenEffects>
-            </a:ext>
-          </a:extLst>
-        </p:spPr>
-        <p:txBody>
-          <a:bodyPr wrap="none" lIns="0" tIns="0" rIns="0" bIns="0" anchor="ctr">
-            <a:spAutoFit/>
-          </a:bodyPr>
-          <a:lstStyle>
-            <a:lvl1pPr>
-              <a:defRPr>
-                <a:solidFill>
-                  <a:srgbClr val="6F6F6F"/>
-                </a:solidFill>
-                <a:latin typeface="Trebuchet MS" panose="020B0603020202020204" pitchFamily="34" charset="0"/>
-                <a:ea typeface="Trebuchet MS" panose="020B0603020202020204" pitchFamily="34" charset="0"/>
-                <a:cs typeface="Trebuchet MS" panose="020B0603020202020204" pitchFamily="34" charset="0"/>
-                <a:sym typeface="Trebuchet MS" panose="020B0603020202020204" pitchFamily="34" charset="0"/>
-              </a:defRPr>
-            </a:lvl1pPr>
-            <a:lvl2pPr marL="742950" indent="-285750">
-              <a:defRPr>
-                <a:solidFill>
-                  <a:srgbClr val="6F6F6F"/>
-                </a:solidFill>
-                <a:latin typeface="Trebuchet MS" panose="020B0603020202020204" pitchFamily="34" charset="0"/>
-                <a:ea typeface="Trebuchet MS" panose="020B0603020202020204" pitchFamily="34" charset="0"/>
-                <a:cs typeface="Trebuchet MS" panose="020B0603020202020204" pitchFamily="34" charset="0"/>
-                <a:sym typeface="Trebuchet MS" panose="020B0603020202020204" pitchFamily="34" charset="0"/>
-              </a:defRPr>
-            </a:lvl2pPr>
-            <a:lvl3pPr marL="1143000" indent="-228600">
-              <a:defRPr>
-                <a:solidFill>
-                  <a:srgbClr val="6F6F6F"/>
-                </a:solidFill>
-                <a:latin typeface="Trebuchet MS" panose="020B0603020202020204" pitchFamily="34" charset="0"/>
-                <a:ea typeface="Trebuchet MS" panose="020B0603020202020204" pitchFamily="34" charset="0"/>
-                <a:cs typeface="Trebuchet MS" panose="020B0603020202020204" pitchFamily="34" charset="0"/>
-                <a:sym typeface="Trebuchet MS" panose="020B0603020202020204" pitchFamily="34" charset="0"/>
-              </a:defRPr>
-            </a:lvl3pPr>
-            <a:lvl4pPr marL="1600200" indent="-228600">
-              <a:defRPr>
-                <a:solidFill>
-                  <a:srgbClr val="6F6F6F"/>
-                </a:solidFill>
-                <a:latin typeface="Trebuchet MS" panose="020B0603020202020204" pitchFamily="34" charset="0"/>
-                <a:ea typeface="Trebuchet MS" panose="020B0603020202020204" pitchFamily="34" charset="0"/>
-                <a:cs typeface="Trebuchet MS" panose="020B0603020202020204" pitchFamily="34" charset="0"/>
-                <a:sym typeface="Trebuchet MS" panose="020B0603020202020204" pitchFamily="34" charset="0"/>
-              </a:defRPr>
-            </a:lvl4pPr>
-            <a:lvl5pPr marL="2057400" indent="-228600">
-              <a:defRPr>
-                <a:solidFill>
-                  <a:srgbClr val="6F6F6F"/>
-                </a:solidFill>
-                <a:latin typeface="Trebuchet MS" panose="020B0603020202020204" pitchFamily="34" charset="0"/>
-                <a:ea typeface="Trebuchet MS" panose="020B0603020202020204" pitchFamily="34" charset="0"/>
-                <a:cs typeface="Trebuchet MS" panose="020B0603020202020204" pitchFamily="34" charset="0"/>
-                <a:sym typeface="Trebuchet MS" panose="020B0603020202020204" pitchFamily="34" charset="0"/>
-              </a:defRPr>
-            </a:lvl5pPr>
-            <a:lvl6pPr marL="2514600" indent="-228600" defTabSz="457200" eaLnBrk="0" fontAlgn="base" hangingPunct="0">
-              <a:spcBef>
-                <a:spcPct val="0"/>
-              </a:spcBef>
-              <a:spcAft>
-                <a:spcPct val="0"/>
-              </a:spcAft>
-              <a:defRPr>
-                <a:solidFill>
-                  <a:srgbClr val="6F6F6F"/>
-                </a:solidFill>
-                <a:latin typeface="Trebuchet MS" panose="020B0603020202020204" pitchFamily="34" charset="0"/>
-                <a:ea typeface="Trebuchet MS" panose="020B0603020202020204" pitchFamily="34" charset="0"/>
-                <a:cs typeface="Trebuchet MS" panose="020B0603020202020204" pitchFamily="34" charset="0"/>
-                <a:sym typeface="Trebuchet MS" panose="020B0603020202020204" pitchFamily="34" charset="0"/>
-              </a:defRPr>
-            </a:lvl6pPr>
-            <a:lvl7pPr marL="2971800" indent="-228600" defTabSz="457200" eaLnBrk="0" fontAlgn="base" hangingPunct="0">
-              <a:spcBef>
-                <a:spcPct val="0"/>
-              </a:spcBef>
-              <a:spcAft>
-                <a:spcPct val="0"/>
-              </a:spcAft>
-              <a:defRPr>
-                <a:solidFill>
-                  <a:srgbClr val="6F6F6F"/>
-                </a:solidFill>
-                <a:latin typeface="Trebuchet MS" panose="020B0603020202020204" pitchFamily="34" charset="0"/>
-                <a:ea typeface="Trebuchet MS" panose="020B0603020202020204" pitchFamily="34" charset="0"/>
-                <a:cs typeface="Trebuchet MS" panose="020B0603020202020204" pitchFamily="34" charset="0"/>
-                <a:sym typeface="Trebuchet MS" panose="020B0603020202020204" pitchFamily="34" charset="0"/>
-              </a:defRPr>
-            </a:lvl7pPr>
-            <a:lvl8pPr marL="3429000" indent="-228600" defTabSz="457200" eaLnBrk="0" fontAlgn="base" hangingPunct="0">
-              <a:spcBef>
-                <a:spcPct val="0"/>
-              </a:spcBef>
-              <a:spcAft>
-                <a:spcPct val="0"/>
-              </a:spcAft>
-              <a:defRPr>
-                <a:solidFill>
-                  <a:srgbClr val="6F6F6F"/>
-                </a:solidFill>
-                <a:latin typeface="Trebuchet MS" panose="020B0603020202020204" pitchFamily="34" charset="0"/>
-                <a:ea typeface="Trebuchet MS" panose="020B0603020202020204" pitchFamily="34" charset="0"/>
-                <a:cs typeface="Trebuchet MS" panose="020B0603020202020204" pitchFamily="34" charset="0"/>
-                <a:sym typeface="Trebuchet MS" panose="020B0603020202020204" pitchFamily="34" charset="0"/>
-              </a:defRPr>
-            </a:lvl8pPr>
-            <a:lvl9pPr marL="3886200" indent="-228600" defTabSz="457200" eaLnBrk="0" fontAlgn="base" hangingPunct="0">
-              <a:spcBef>
-                <a:spcPct val="0"/>
-              </a:spcBef>
-              <a:spcAft>
-                <a:spcPct val="0"/>
-              </a:spcAft>
-              <a:defRPr>
-                <a:solidFill>
-                  <a:srgbClr val="6F6F6F"/>
-                </a:solidFill>
-                <a:latin typeface="Trebuchet MS" panose="020B0603020202020204" pitchFamily="34" charset="0"/>
-                <a:ea typeface="Trebuchet MS" panose="020B0603020202020204" pitchFamily="34" charset="0"/>
-                <a:cs typeface="Trebuchet MS" panose="020B0603020202020204" pitchFamily="34" charset="0"/>
-                <a:sym typeface="Trebuchet MS" panose="020B0603020202020204" pitchFamily="34" charset="0"/>
-              </a:defRPr>
-            </a:lvl9pPr>
-          </a:lstStyle>
-          <a:p>
-            <a:pPr eaLnBrk="1">
-              <a:defRPr/>
-            </a:pPr>
-            <a:fld id="{E957024F-A389-415F-B6B3-B751FD29DF88}" type="slidenum">
-              <a:rPr lang="en-US" altLang="en-US" sz="600" smtClean="0">
-                <a:solidFill>
-                  <a:srgbClr val="FFFFFF"/>
-                </a:solidFill>
-                <a:latin typeface="Arial" panose="020B0604020202020204" pitchFamily="34" charset="0"/>
-                <a:cs typeface="Arial" panose="020B0604020202020204" pitchFamily="34" charset="0"/>
-                <a:sym typeface="Arial" panose="020B0604020202020204" pitchFamily="34" charset="0"/>
-              </a:rPr>
-              <a:pPr eaLnBrk="1">
-                <a:defRPr/>
-              </a:pPr>
-              <a:t>10</a:t>
-            </a:fld>
-            <a:endParaRPr lang="en-US" altLang="en-US" sz="600">
-              <a:solidFill>
-                <a:srgbClr val="FFFFFF"/>
-              </a:solidFill>
-              <a:latin typeface="Arial" panose="020B0604020202020204" pitchFamily="34" charset="0"/>
-              <a:cs typeface="Arial" panose="020B0604020202020204" pitchFamily="34" charset="0"/>
-              <a:sym typeface="Arial" panose="020B0604020202020204" pitchFamily="34" charset="0"/>
-            </a:endParaRPr>
-          </a:p>
-        </p:txBody>
-      </p:sp>
-      <p:pic>
-        <p:nvPicPr>
-          <p:cNvPr id="50178" name="Picture 2" descr="resultsKMeans.png">
-            <a:extLst>
-              <a:ext uri="{FF2B5EF4-FFF2-40B4-BE49-F238E27FC236}">
-                <a16:creationId xmlns:a16="http://schemas.microsoft.com/office/drawing/2014/main" id="{1B43268A-15B6-4394-A32E-C9D84694DAFA}"/>
-              </a:ext>
-            </a:extLst>
-          </p:cNvPr>
-          <p:cNvPicPr>
-            <a:picLocks noChangeAspect="1"/>
-          </p:cNvPicPr>
-          <p:nvPr/>
-        </p:nvPicPr>
-        <p:blipFill>
-          <a:blip r:embed="rId2">
-            <a:extLst>
-              <a:ext uri="{28A0092B-C50C-407E-A947-70E740481C1C}">
-                <a14:useLocalDpi xmlns:a14="http://schemas.microsoft.com/office/drawing/2010/main" val="0"/>
-              </a:ext>
-            </a:extLst>
-          </a:blip>
-          <a:srcRect/>
-          <a:stretch>
-            <a:fillRect/>
-          </a:stretch>
-        </p:blipFill>
-        <p:spPr bwMode="auto">
-          <a:xfrm>
-            <a:off x="-3175" y="-7938"/>
-            <a:ext cx="10798175" cy="5999163"/>
-          </a:xfrm>
-          <a:prstGeom prst="rect">
-            <a:avLst/>
-          </a:prstGeom>
-          <a:noFill/>
-          <a:ln>
-            <a:noFill/>
-          </a:ln>
-          <a:effectLst/>
-          <a:extLst>
-            <a:ext uri="{909E8E84-426E-40DD-AFC4-6F175D3DCCD1}">
-              <a14:hiddenFill xmlns:a14="http://schemas.microsoft.com/office/drawing/2010/main">
-                <a:solidFill>
-                  <a:srgbClr val="FFFFFF"/>
-                </a:solidFill>
-              </a14:hiddenFill>
-            </a:ext>
-            <a:ext uri="{91240B29-F687-4F45-9708-019B960494DF}">
-              <a14:hiddenLine xmlns:a14="http://schemas.microsoft.com/office/drawing/2010/main" w="12700" cap="flat" cmpd="sng">
-                <a:solidFill>
-                  <a:srgbClr val="000000"/>
-                </a:solidFill>
-                <a:prstDash val="solid"/>
-                <a:miter lim="400000"/>
-                <a:headEnd type="none" w="med" len="med"/>
-                <a:tailEnd type="none" w="med" len="med"/>
-              </a14:hiddenLine>
-            </a:ext>
-            <a:ext uri="{AF507438-7753-43E0-B8FC-AC1667EBCBE1}">
-              <a14:hiddenEffects xmlns:a14="http://schemas.microsoft.com/office/drawing/2010/main">
-                <a:effectLst>
-                  <a:outerShdw blurRad="63500" dist="38099" dir="2700000" algn="ctr" rotWithShape="0">
-                    <a:srgbClr val="000000">
-                      <a:alpha val="74998"/>
-                    </a:srgbClr>
-                  </a:outerShdw>
-                </a:effectLst>
-              </a14:hiddenEffects>
-            </a:ext>
-          </a:extLst>
-        </p:spPr>
-      </p:pic>
-    </p:spTree>
-  </p:cSld>
-  <p:clrMapOvr>
-    <a:masterClrMapping/>
-  </p:clrMapOvr>
-  <p:transition spd="med"/>
-</p:sld>
-</file>
-
-<file path=ppt/slides/slide2.xml><?xml version="1.0" encoding="utf-8"?>
-<p:sld xmlns:a="http://schemas.openxmlformats.org/drawingml/2006/main" xmlns:r="http://schemas.openxmlformats.org/officeDocument/2006/relationships" xmlns:p="http://schemas.openxmlformats.org/presentationml/2006/main">
-  <p:cSld>
-    <p:spTree>
-      <p:nvGrpSpPr>
-        <p:cNvPr id="1" name=""/>
-        <p:cNvGrpSpPr/>
-        <p:nvPr/>
-      </p:nvGrpSpPr>
-      <p:grpSpPr>
-        <a:xfrm>
-          <a:off x="0" y="0"/>
-          <a:ext cx="0" cy="0"/>
-          <a:chOff x="0" y="0"/>
-          <a:chExt cx="0" cy="0"/>
-        </a:xfrm>
-      </p:grpSpPr>
-      <p:sp>
-        <p:nvSpPr>
           <p:cNvPr id="2" name="Title 1">
             <a:extLst>
               <a:ext uri="{FF2B5EF4-FFF2-40B4-BE49-F238E27FC236}">
-                <a16:creationId xmlns:a16="http://schemas.microsoft.com/office/drawing/2014/main" id="{A7036E94-7BA3-4467-94BD-F85407280645}"/>
+                <a16:creationId xmlns="" xmlns:a16="http://schemas.microsoft.com/office/drawing/2014/main" id="{A7036E94-7BA3-4467-94BD-F85407280645}"/>
               </a:ext>
             </a:extLst>
           </p:cNvPr>
@@ -8549,8 +7915,17 @@
               <a:rPr lang="en-US" dirty="0">
                 <a:sym typeface="Arial" charset="0"/>
               </a:rPr>
-              <a:t>Generalized Linear Modelling in h2o4gpu</a:t>
-            </a:r>
+              <a:t>Generalized Linear Modelling in </a:t>
+            </a:r>
+            <a:r>
+              <a:rPr lang="en-US" dirty="0" smtClean="0">
+                <a:sym typeface="Arial" charset="0"/>
+              </a:rPr>
+              <a:t>H2O4GPU</a:t>
+            </a:r>
+            <a:endParaRPr lang="en-US" dirty="0">
+              <a:sym typeface="Arial" charset="0"/>
+            </a:endParaRPr>
           </a:p>
         </p:txBody>
       </p:sp>
@@ -8559,7 +7934,7 @@
           <p:cNvPr id="3" name="Content Placeholder 2">
             <a:extLst>
               <a:ext uri="{FF2B5EF4-FFF2-40B4-BE49-F238E27FC236}">
-                <a16:creationId xmlns:a16="http://schemas.microsoft.com/office/drawing/2014/main" id="{1A4209EF-6AF4-48F5-9E0E-F70615E197E6}"/>
+                <a16:creationId xmlns="" xmlns:a16="http://schemas.microsoft.com/office/drawing/2014/main" id="{1A4209EF-6AF4-48F5-9E0E-F70615E197E6}"/>
               </a:ext>
             </a:extLst>
           </p:cNvPr>
@@ -8584,17 +7959,37 @@
               <a:defRPr/>
             </a:pPr>
             <a:r>
-              <a:rPr lang="en-US" altLang="en-US" sz="1600"/>
-              <a:t>Framework utilizes Proximal Graph Solver (POGS) from Stephen Boyd &amp; Chris Fougner (</a:t>
-            </a:r>
-            <a:r>
-              <a:rPr lang="en-US" altLang="en-US" sz="1600">
+              <a:rPr lang="en-US" altLang="en-US" sz="1600" dirty="0"/>
+              <a:t>Framework utilizes Proximal Graph Solver (POGS) from Stephen Boyd &amp; Chris </a:t>
+            </a:r>
+            <a:r>
+              <a:rPr lang="en-US" altLang="en-US" sz="1600" dirty="0" err="1"/>
+              <a:t>Fougner</a:t>
+            </a:r>
+            <a:r>
+              <a:rPr lang="en-US" altLang="en-US" sz="1600" dirty="0"/>
+              <a:t> (</a:t>
+            </a:r>
+            <a:r>
+              <a:rPr lang="en-US" altLang="en-US" sz="1600" dirty="0">
                 <a:hlinkClick r:id="rId2" tooltip="Parameter Selection and Pre-Conditioning for a Graph Form Solver -- C. Fougner and S. Boyd"/>
               </a:rPr>
-              <a:t>Parameter Selection and Pre-Conditioning for a Graph Form Solver -- C. Fougner and S. Boyd</a:t>
-            </a:r>
-            <a:r>
-              <a:rPr lang="en-US" altLang="en-US" sz="1600"/>
+              <a:t>Parameter Selection and Pre-Conditioning for a Graph Form Solver -- C. </a:t>
+            </a:r>
+            <a:r>
+              <a:rPr lang="en-US" altLang="en-US" sz="1600" dirty="0" err="1">
+                <a:hlinkClick r:id="rId2" tooltip="Parameter Selection and Pre-Conditioning for a Graph Form Solver -- C. Fougner and S. Boyd"/>
+              </a:rPr>
+              <a:t>Fougner</a:t>
+            </a:r>
+            <a:r>
+              <a:rPr lang="en-US" altLang="en-US" sz="1600" dirty="0">
+                <a:hlinkClick r:id="rId2" tooltip="Parameter Selection and Pre-Conditioning for a Graph Form Solver -- C. Fougner and S. Boyd"/>
+              </a:rPr>
+              <a:t> and S. Boyd</a:t>
+            </a:r>
+            <a:r>
+              <a:rPr lang="en-US" altLang="en-US" sz="1600" dirty="0"/>
               <a:t>)</a:t>
             </a:r>
           </a:p>
@@ -8603,25 +7998,25 @@
               <a:defRPr/>
             </a:pPr>
             <a:r>
-              <a:rPr lang="en-US" altLang="en-US" sz="1600"/>
+              <a:rPr lang="en-US" altLang="en-US" sz="1600" dirty="0"/>
               <a:t>A solver for convex optimization problems in </a:t>
             </a:r>
             <a:r>
-              <a:rPr lang="en-US" altLang="en-US" sz="1600" i="1"/>
+              <a:rPr lang="en-US" altLang="en-US" sz="1600" i="1" dirty="0"/>
               <a:t>graph form</a:t>
             </a:r>
             <a:r>
-              <a:rPr lang="en-US" altLang="en-US" sz="1600"/>
+              <a:rPr lang="en-US" altLang="en-US" sz="1600" dirty="0"/>
               <a:t> using </a:t>
             </a:r>
             <a:r>
-              <a:rPr lang="en-US" altLang="en-US" sz="1600">
+              <a:rPr lang="en-US" altLang="en-US" sz="1600" dirty="0">
                 <a:hlinkClick r:id="rId3"/>
               </a:rPr>
               <a:t>Alternating Direction Method of Multipliers</a:t>
             </a:r>
             <a:r>
-              <a:rPr lang="en-US" altLang="en-US" sz="1600"/>
+              <a:rPr lang="en-US" altLang="en-US" sz="1600" dirty="0"/>
               <a:t> (ADMM)</a:t>
             </a:r>
           </a:p>
@@ -8630,7 +8025,7 @@
               <a:defRPr/>
             </a:pPr>
             <a:r>
-              <a:rPr lang="en-US" altLang="en-US" sz="1600"/>
+              <a:rPr lang="en-US" altLang="en-US" sz="1600" dirty="0"/>
               <a:t>Solvers include Lasso, Ridge Regression, Logistic Regression, and Elastic Net Regularization</a:t>
             </a:r>
           </a:p>
@@ -8639,7 +8034,7 @@
               <a:defRPr/>
             </a:pPr>
             <a:r>
-              <a:rPr lang="en-US" altLang="en-US" sz="1600"/>
+              <a:rPr lang="en-US" altLang="en-US" sz="1600" dirty="0"/>
               <a:t>Improvements to original implementation of POGS:</a:t>
             </a:r>
           </a:p>
@@ -8648,7 +8043,7 @@
               <a:defRPr/>
             </a:pPr>
             <a:r>
-              <a:rPr lang="en-US" altLang="en-US" sz="1600"/>
+              <a:rPr lang="en-US" altLang="en-US" sz="1600" dirty="0"/>
               <a:t>Full alpha search</a:t>
             </a:r>
           </a:p>
@@ -8657,7 +8052,7 @@
               <a:defRPr/>
             </a:pPr>
             <a:r>
-              <a:rPr lang="en-US" altLang="en-US" sz="1600"/>
+              <a:rPr lang="en-US" altLang="en-US" sz="1600" dirty="0"/>
               <a:t>Cross Validation</a:t>
             </a:r>
           </a:p>
@@ -8666,8 +8061,16 @@
               <a:defRPr/>
             </a:pPr>
             <a:r>
-              <a:rPr lang="en-US" altLang="en-US" sz="1600"/>
-              <a:t>Early Stopping (RMSE for regression problems and Logloss for classification)</a:t>
+              <a:rPr lang="en-US" altLang="en-US" sz="1600" dirty="0"/>
+              <a:t>Early Stopping (RMSE for regression problems and </a:t>
+            </a:r>
+            <a:r>
+              <a:rPr lang="en-US" altLang="en-US" sz="1600" dirty="0" err="1"/>
+              <a:t>Logloss</a:t>
+            </a:r>
+            <a:r>
+              <a:rPr lang="en-US" altLang="en-US" sz="1600" dirty="0"/>
+              <a:t> for classification)</a:t>
             </a:r>
           </a:p>
           <a:p>
@@ -8675,7 +8078,7 @@
               <a:defRPr/>
             </a:pPr>
             <a:r>
-              <a:rPr lang="en-US" altLang="en-US" sz="1600"/>
+              <a:rPr lang="en-US" altLang="en-US" sz="1600" dirty="0"/>
               <a:t>Various bug fixes from original implementation</a:t>
             </a:r>
           </a:p>
@@ -8684,8 +8087,16 @@
               <a:defRPr/>
             </a:pPr>
             <a:r>
-              <a:rPr lang="en-US" altLang="en-US" sz="1600"/>
-              <a:t>Added Scikit learn “like” API</a:t>
+              <a:rPr lang="en-US" altLang="en-US" sz="1600" dirty="0"/>
+              <a:t>Added </a:t>
+            </a:r>
+            <a:r>
+              <a:rPr lang="en-US" altLang="en-US" sz="1600" dirty="0" err="1"/>
+              <a:t>Scikit</a:t>
+            </a:r>
+            <a:r>
+              <a:rPr lang="en-US" altLang="en-US" sz="1600" dirty="0"/>
+              <a:t> learn “like” API</a:t>
             </a:r>
           </a:p>
           <a:p>
@@ -8693,21 +8104,26 @@
               <a:defRPr/>
             </a:pPr>
             <a:r>
-              <a:rPr lang="en-US" altLang="en-US" sz="1600"/>
-              <a:t>Supports multiple GPUS</a:t>
-            </a:r>
+              <a:rPr lang="en-US" altLang="en-US" sz="1600" dirty="0"/>
+              <a:t>Supports multiple </a:t>
+            </a:r>
+            <a:r>
+              <a:rPr lang="en-US" altLang="en-US" sz="1600" dirty="0" smtClean="0"/>
+              <a:t>GPUs</a:t>
+            </a:r>
+            <a:endParaRPr lang="en-US" altLang="en-US" sz="1600" dirty="0"/>
           </a:p>
           <a:p>
             <a:pPr lvl="1">
               <a:defRPr/>
             </a:pPr>
-            <a:endParaRPr lang="en-US" altLang="en-US" sz="1600"/>
+            <a:endParaRPr lang="en-US" altLang="en-US" sz="1600" dirty="0"/>
           </a:p>
           <a:p>
             <a:pPr>
               <a:defRPr/>
             </a:pPr>
-            <a:endParaRPr lang="en-US" altLang="en-US" sz="1600"/>
+            <a:endParaRPr lang="en-US" altLang="en-US" sz="1600" dirty="0"/>
           </a:p>
         </p:txBody>
       </p:sp>
@@ -8716,7 +8132,7 @@
           <p:cNvPr id="21508" name="pasted-image.png">
             <a:extLst>
               <a:ext uri="{FF2B5EF4-FFF2-40B4-BE49-F238E27FC236}">
-                <a16:creationId xmlns:a16="http://schemas.microsoft.com/office/drawing/2014/main" id="{8390369D-ABE6-4ACB-8637-B276321ECF19}"/>
+                <a16:creationId xmlns="" xmlns:a16="http://schemas.microsoft.com/office/drawing/2014/main" id="{8390369D-ABE6-4ACB-8637-B276321ECF19}"/>
               </a:ext>
             </a:extLst>
           </p:cNvPr>
@@ -8776,7 +8192,7 @@
           <p:cNvPr id="21509" name="pasted-image.png">
             <a:extLst>
               <a:ext uri="{FF2B5EF4-FFF2-40B4-BE49-F238E27FC236}">
-                <a16:creationId xmlns:a16="http://schemas.microsoft.com/office/drawing/2014/main" id="{B80007EF-A3EE-49D9-96D6-08E7E9260FC2}"/>
+                <a16:creationId xmlns="" xmlns:a16="http://schemas.microsoft.com/office/drawing/2014/main" id="{B80007EF-A3EE-49D9-96D6-08E7E9260FC2}"/>
               </a:ext>
             </a:extLst>
           </p:cNvPr>
@@ -8836,7 +8252,7 @@
           <p:cNvPr id="21510" name="pasted-image.png">
             <a:extLst>
               <a:ext uri="{FF2B5EF4-FFF2-40B4-BE49-F238E27FC236}">
-                <a16:creationId xmlns:a16="http://schemas.microsoft.com/office/drawing/2014/main" id="{29A26CD8-216E-43E7-A6C4-0BB56B050DE2}"/>
+                <a16:creationId xmlns="" xmlns:a16="http://schemas.microsoft.com/office/drawing/2014/main" id="{29A26CD8-216E-43E7-A6C4-0BB56B050DE2}"/>
               </a:ext>
             </a:extLst>
           </p:cNvPr>
@@ -8896,7 +8312,7 @@
           <p:cNvPr id="21511" name="pasted-image.png">
             <a:extLst>
               <a:ext uri="{FF2B5EF4-FFF2-40B4-BE49-F238E27FC236}">
-                <a16:creationId xmlns:a16="http://schemas.microsoft.com/office/drawing/2014/main" id="{10A80A59-9522-4D91-BCB0-AB460FF3AC4B}"/>
+                <a16:creationId xmlns="" xmlns:a16="http://schemas.microsoft.com/office/drawing/2014/main" id="{10A80A59-9522-4D91-BCB0-AB460FF3AC4B}"/>
               </a:ext>
             </a:extLst>
           </p:cNvPr>
@@ -8956,7 +8372,7 @@
           <p:cNvPr id="21512" name="pasted-image.png">
             <a:extLst>
               <a:ext uri="{FF2B5EF4-FFF2-40B4-BE49-F238E27FC236}">
-                <a16:creationId xmlns:a16="http://schemas.microsoft.com/office/drawing/2014/main" id="{5462B706-10A1-4AFF-A0E0-44B27EBB8A00}"/>
+                <a16:creationId xmlns="" xmlns:a16="http://schemas.microsoft.com/office/drawing/2014/main" id="{5462B706-10A1-4AFF-A0E0-44B27EBB8A00}"/>
               </a:ext>
             </a:extLst>
           </p:cNvPr>
@@ -9016,7 +8432,7 @@
           <p:cNvPr id="21513" name="pasted-image.png">
             <a:extLst>
               <a:ext uri="{FF2B5EF4-FFF2-40B4-BE49-F238E27FC236}">
-                <a16:creationId xmlns:a16="http://schemas.microsoft.com/office/drawing/2014/main" id="{6526E3F6-76AF-48C3-B0F4-3767CCFF4DBA}"/>
+                <a16:creationId xmlns="" xmlns:a16="http://schemas.microsoft.com/office/drawing/2014/main" id="{6526E3F6-76AF-48C3-B0F4-3767CCFF4DBA}"/>
               </a:ext>
             </a:extLst>
           </p:cNvPr>
@@ -9076,7 +8492,7 @@
           <p:cNvPr id="21514" name="pasted-image.png">
             <a:extLst>
               <a:ext uri="{FF2B5EF4-FFF2-40B4-BE49-F238E27FC236}">
-                <a16:creationId xmlns:a16="http://schemas.microsoft.com/office/drawing/2014/main" id="{34216733-9DC6-489F-9381-1C4030788F7F}"/>
+                <a16:creationId xmlns="" xmlns:a16="http://schemas.microsoft.com/office/drawing/2014/main" id="{34216733-9DC6-489F-9381-1C4030788F7F}"/>
               </a:ext>
             </a:extLst>
           </p:cNvPr>
@@ -9136,7 +8552,7 @@
           <p:cNvPr id="21515" name="Shape 1914">
             <a:extLst>
               <a:ext uri="{FF2B5EF4-FFF2-40B4-BE49-F238E27FC236}">
-                <a16:creationId xmlns:a16="http://schemas.microsoft.com/office/drawing/2014/main" id="{C4281931-FA47-4B6D-B5E2-B1C27288D5BC}"/>
+                <a16:creationId xmlns="" xmlns:a16="http://schemas.microsoft.com/office/drawing/2014/main" id="{C4281931-FA47-4B6D-B5E2-B1C27288D5BC}"/>
               </a:ext>
             </a:extLst>
           </p:cNvPr>
@@ -9321,7 +8737,7 @@
           <p:cNvPr id="21516" name="Shape 1914">
             <a:extLst>
               <a:ext uri="{FF2B5EF4-FFF2-40B4-BE49-F238E27FC236}">
-                <a16:creationId xmlns:a16="http://schemas.microsoft.com/office/drawing/2014/main" id="{C70AFAC8-E76A-4C5D-9924-EFEFD36AB1FC}"/>
+                <a16:creationId xmlns="" xmlns:a16="http://schemas.microsoft.com/office/drawing/2014/main" id="{C70AFAC8-E76A-4C5D-9924-EFEFD36AB1FC}"/>
               </a:ext>
             </a:extLst>
           </p:cNvPr>
@@ -9609,7 +9025,7 @@
           <p:cNvPr id="21517" name="pasted-image.png">
             <a:extLst>
               <a:ext uri="{FF2B5EF4-FFF2-40B4-BE49-F238E27FC236}">
-                <a16:creationId xmlns:a16="http://schemas.microsoft.com/office/drawing/2014/main" id="{FD2CD870-4DAE-46D3-9155-B8F39F2840E4}"/>
+                <a16:creationId xmlns="" xmlns:a16="http://schemas.microsoft.com/office/drawing/2014/main" id="{FD2CD870-4DAE-46D3-9155-B8F39F2840E4}"/>
               </a:ext>
             </a:extLst>
           </p:cNvPr>
@@ -9669,7 +9085,7 @@
           <p:cNvPr id="21518" name="pasted-image.png">
             <a:extLst>
               <a:ext uri="{FF2B5EF4-FFF2-40B4-BE49-F238E27FC236}">
-                <a16:creationId xmlns:a16="http://schemas.microsoft.com/office/drawing/2014/main" id="{9D3D20D3-0389-447C-AE23-8414FFCF35C1}"/>
+                <a16:creationId xmlns="" xmlns:a16="http://schemas.microsoft.com/office/drawing/2014/main" id="{9D3D20D3-0389-447C-AE23-8414FFCF35C1}"/>
               </a:ext>
             </a:extLst>
           </p:cNvPr>
@@ -9730,7 +9146,7 @@
             <a:hlinkClick r:id="" action="ppaction://hlinkshowjump?jump=nextslide"/>
             <a:extLst>
               <a:ext uri="{FF2B5EF4-FFF2-40B4-BE49-F238E27FC236}">
-                <a16:creationId xmlns:a16="http://schemas.microsoft.com/office/drawing/2014/main" id="{CC1BACCD-EB36-4883-89B2-7DDAA63E006C}"/>
+                <a16:creationId xmlns="" xmlns:a16="http://schemas.microsoft.com/office/drawing/2014/main" id="{CC1BACCD-EB36-4883-89B2-7DDAA63E006C}"/>
               </a:ext>
             </a:extLst>
           </p:cNvPr>
@@ -9916,7 +9332,7 @@
             <a:hlinkClick r:id="" action="ppaction://hlinkshowjump?jump=nextslide"/>
             <a:extLst>
               <a:ext uri="{FF2B5EF4-FFF2-40B4-BE49-F238E27FC236}">
-                <a16:creationId xmlns:a16="http://schemas.microsoft.com/office/drawing/2014/main" id="{A1476649-BCC4-448A-9933-D9C04EF27F2B}"/>
+                <a16:creationId xmlns="" xmlns:a16="http://schemas.microsoft.com/office/drawing/2014/main" id="{A1476649-BCC4-448A-9933-D9C04EF27F2B}"/>
               </a:ext>
             </a:extLst>
           </p:cNvPr>
@@ -10204,10 +9620,17 @@
   <p:clrMapOvr>
     <a:masterClrMapping/>
   </p:clrMapOvr>
+  <p:timing>
+    <p:tnLst>
+      <p:par>
+        <p:cTn id="1" dur="indefinite" restart="never" nodeType="tmRoot"/>
+      </p:par>
+    </p:tnLst>
+  </p:timing>
 </p:sld>
 </file>
 
-<file path=ppt/slides/slide3.xml><?xml version="1.0" encoding="utf-8"?>
+<file path=ppt/slides/slide2.xml><?xml version="1.0" encoding="utf-8"?>
 <p:sld xmlns:a="http://schemas.openxmlformats.org/drawingml/2006/main" xmlns:r="http://schemas.openxmlformats.org/officeDocument/2006/relationships" xmlns:p="http://schemas.openxmlformats.org/presentationml/2006/main">
   <p:cSld>
     <p:spTree>
@@ -10229,7 +9652,7 @@
           <p:cNvPr id="47105" name="Text Box 1" descr="TextBox 11">
             <a:extLst>
               <a:ext uri="{FF2B5EF4-FFF2-40B4-BE49-F238E27FC236}">
-                <a16:creationId xmlns:a16="http://schemas.microsoft.com/office/drawing/2014/main" id="{D10FD07E-705F-48FE-9FFA-DC96B96540F8}"/>
+                <a16:creationId xmlns="" xmlns:a16="http://schemas.microsoft.com/office/drawing/2014/main" id="{D10FD07E-705F-48FE-9FFA-DC96B96540F8}"/>
               </a:ext>
             </a:extLst>
           </p:cNvPr>
@@ -10428,7 +9851,7 @@
               <a:pPr eaLnBrk="1">
                 <a:defRPr/>
               </a:pPr>
-              <a:t>3</a:t>
+              <a:t>2</a:t>
             </a:fld>
             <a:endParaRPr lang="en-US" altLang="en-US" sz="600">
               <a:solidFill>
@@ -10447,7 +9870,7 @@
             <a:hlinkClick r:id="rId2"/>
             <a:extLst>
               <a:ext uri="{FF2B5EF4-FFF2-40B4-BE49-F238E27FC236}">
-                <a16:creationId xmlns:a16="http://schemas.microsoft.com/office/drawing/2014/main" id="{0F6BC751-2680-4B24-9916-0520F20970A7}"/>
+                <a16:creationId xmlns="" xmlns:a16="http://schemas.microsoft.com/office/drawing/2014/main" id="{0F6BC751-2680-4B24-9916-0520F20970A7}"/>
               </a:ext>
             </a:extLst>
           </p:cNvPr>
@@ -10521,7 +9944,7 @@
             <a:hlinkClick r:id="rId4"/>
             <a:extLst>
               <a:ext uri="{FF2B5EF4-FFF2-40B4-BE49-F238E27FC236}">
-                <a16:creationId xmlns:a16="http://schemas.microsoft.com/office/drawing/2014/main" id="{BF1B1163-83F6-4B0C-85AB-38195F90C3B7}"/>
+                <a16:creationId xmlns="" xmlns:a16="http://schemas.microsoft.com/office/drawing/2014/main" id="{BF1B1163-83F6-4B0C-85AB-38195F90C3B7}"/>
               </a:ext>
             </a:extLst>
           </p:cNvPr>
@@ -10738,7 +10161,7 @@
           <p:cNvPr id="47108" name="Picture 4" descr="Screen Shot 2017-06-18 at 10.31.24 PM.png">
             <a:extLst>
               <a:ext uri="{FF2B5EF4-FFF2-40B4-BE49-F238E27FC236}">
-                <a16:creationId xmlns:a16="http://schemas.microsoft.com/office/drawing/2014/main" id="{EE0D6CF2-D589-427F-B53E-8DA8FAB374DE}"/>
+                <a16:creationId xmlns="" xmlns:a16="http://schemas.microsoft.com/office/drawing/2014/main" id="{EE0D6CF2-D589-427F-B53E-8DA8FAB374DE}"/>
               </a:ext>
             </a:extLst>
           </p:cNvPr>
@@ -10812,10 +10235,17 @@
     <a:masterClrMapping/>
   </p:clrMapOvr>
   <p:transition spd="med"/>
+  <p:timing>
+    <p:tnLst>
+      <p:par>
+        <p:cTn id="1" dur="indefinite" restart="never" nodeType="tmRoot"/>
+      </p:par>
+    </p:tnLst>
+  </p:timing>
 </p:sld>
 </file>
 
-<file path=ppt/slides/slide4.xml><?xml version="1.0" encoding="utf-8"?>
+<file path=ppt/slides/slide3.xml><?xml version="1.0" encoding="utf-8"?>
 <p:sld xmlns:a="http://schemas.openxmlformats.org/drawingml/2006/main" xmlns:r="http://schemas.openxmlformats.org/officeDocument/2006/relationships" xmlns:p="http://schemas.openxmlformats.org/presentationml/2006/main">
   <p:cSld>
     <p:spTree>
@@ -10837,7 +10267,7 @@
           <p:cNvPr id="48129" name="Text Box 1" descr="TextBox 11">
             <a:extLst>
               <a:ext uri="{FF2B5EF4-FFF2-40B4-BE49-F238E27FC236}">
-                <a16:creationId xmlns:a16="http://schemas.microsoft.com/office/drawing/2014/main" id="{32B50C81-4FEE-41CB-839A-699729835B23}"/>
+                <a16:creationId xmlns="" xmlns:a16="http://schemas.microsoft.com/office/drawing/2014/main" id="{32B50C81-4FEE-41CB-839A-699729835B23}"/>
               </a:ext>
             </a:extLst>
           </p:cNvPr>
@@ -11036,7 +10466,7 @@
               <a:pPr eaLnBrk="1">
                 <a:defRPr/>
               </a:pPr>
-              <a:t>4</a:t>
+              <a:t>3</a:t>
             </a:fld>
             <a:endParaRPr lang="en-US" altLang="en-US" sz="600">
               <a:solidFill>
@@ -11054,7 +10484,7 @@
           <p:cNvPr id="48130" name="Picture 2" descr="resultsAlphaLambdaCV2.png">
             <a:extLst>
               <a:ext uri="{FF2B5EF4-FFF2-40B4-BE49-F238E27FC236}">
-                <a16:creationId xmlns:a16="http://schemas.microsoft.com/office/drawing/2014/main" id="{AF7066EF-1F7A-4676-8FE2-67EA30D09BB4}"/>
+                <a16:creationId xmlns="" xmlns:a16="http://schemas.microsoft.com/office/drawing/2014/main" id="{AF7066EF-1F7A-4676-8FE2-67EA30D09BB4}"/>
               </a:ext>
             </a:extLst>
           </p:cNvPr>
@@ -11127,7 +10557,7 @@
           <p:cNvPr id="48131" name="Text Box 3">
             <a:extLst>
               <a:ext uri="{FF2B5EF4-FFF2-40B4-BE49-F238E27FC236}">
-                <a16:creationId xmlns:a16="http://schemas.microsoft.com/office/drawing/2014/main" id="{BBE3D226-3517-488B-B2E5-F68CFC8387D4}"/>
+                <a16:creationId xmlns="" xmlns:a16="http://schemas.microsoft.com/office/drawing/2014/main" id="{BBE3D226-3517-488B-B2E5-F68CFC8387D4}"/>
               </a:ext>
             </a:extLst>
           </p:cNvPr>
@@ -11345,10 +10775,17 @@
     <a:masterClrMapping/>
   </p:clrMapOvr>
   <p:transition spd="med"/>
+  <p:timing>
+    <p:tnLst>
+      <p:par>
+        <p:cTn id="1" dur="indefinite" restart="never" nodeType="tmRoot"/>
+      </p:par>
+    </p:tnLst>
+  </p:timing>
 </p:sld>
 </file>
 
-<file path=ppt/slides/slide5.xml><?xml version="1.0" encoding="utf-8"?>
+<file path=ppt/slides/slide4.xml><?xml version="1.0" encoding="utf-8"?>
 <p:sld xmlns:a="http://schemas.openxmlformats.org/drawingml/2006/main" xmlns:r="http://schemas.openxmlformats.org/officeDocument/2006/relationships" xmlns:p="http://schemas.openxmlformats.org/presentationml/2006/main">
   <p:cSld>
     <p:spTree>
@@ -11370,7 +10807,7 @@
           <p:cNvPr id="2" name="Title 1">
             <a:extLst>
               <a:ext uri="{FF2B5EF4-FFF2-40B4-BE49-F238E27FC236}">
-                <a16:creationId xmlns:a16="http://schemas.microsoft.com/office/drawing/2014/main" id="{A7AF3E4E-A8FB-42EB-80A9-C1410DCF4B24}"/>
+                <a16:creationId xmlns="" xmlns:a16="http://schemas.microsoft.com/office/drawing/2014/main" id="{A7AF3E4E-A8FB-42EB-80A9-C1410DCF4B24}"/>
               </a:ext>
             </a:extLst>
           </p:cNvPr>
@@ -11393,7 +10830,13 @@
               <a:rPr lang="en-US" dirty="0">
                 <a:sym typeface="Arial" charset="0"/>
               </a:rPr>
-              <a:t>Gradient Boosting Machines in H2O4gpu</a:t>
+              <a:t>Gradient Boosting Machines in </a:t>
+            </a:r>
+            <a:r>
+              <a:rPr lang="en-US" dirty="0" smtClean="0">
+                <a:sym typeface="Arial" charset="0"/>
+              </a:rPr>
+              <a:t>H2O4GPU</a:t>
             </a:r>
             <a:endParaRPr lang="en-US" dirty="0"/>
           </a:p>
@@ -11404,7 +10847,7 @@
           <p:cNvPr id="24579" name="Content Placeholder 2">
             <a:extLst>
               <a:ext uri="{FF2B5EF4-FFF2-40B4-BE49-F238E27FC236}">
-                <a16:creationId xmlns:a16="http://schemas.microsoft.com/office/drawing/2014/main" id="{79BD82FE-4F78-4704-BDB9-F69B19CE8D8A}"/>
+                <a16:creationId xmlns="" xmlns:a16="http://schemas.microsoft.com/office/drawing/2014/main" id="{79BD82FE-4F78-4704-BDB9-F69B19CE8D8A}"/>
               </a:ext>
             </a:extLst>
           </p:cNvPr>
@@ -11502,7 +10945,7 @@
           <p:cNvPr id="24580" name="Picture 2" descr="Figure 1. Decision tree 0.">
             <a:extLst>
               <a:ext uri="{FF2B5EF4-FFF2-40B4-BE49-F238E27FC236}">
-                <a16:creationId xmlns:a16="http://schemas.microsoft.com/office/drawing/2014/main" id="{D3469914-1CC0-482E-9C5A-14999501F216}"/>
+                <a16:creationId xmlns="" xmlns:a16="http://schemas.microsoft.com/office/drawing/2014/main" id="{D3469914-1CC0-482E-9C5A-14999501F216}"/>
               </a:ext>
             </a:extLst>
           </p:cNvPr>
@@ -11562,7 +11005,7 @@
           <p:cNvPr id="24581" name="Picture 4" descr="Figure 2. Decision tree 1.">
             <a:extLst>
               <a:ext uri="{FF2B5EF4-FFF2-40B4-BE49-F238E27FC236}">
-                <a16:creationId xmlns:a16="http://schemas.microsoft.com/office/drawing/2014/main" id="{7EB23279-B857-44B1-9467-6AEE4489A1C2}"/>
+                <a16:creationId xmlns="" xmlns:a16="http://schemas.microsoft.com/office/drawing/2014/main" id="{7EB23279-B857-44B1-9467-6AEE4489A1C2}"/>
               </a:ext>
             </a:extLst>
           </p:cNvPr>
@@ -11622,7 +11065,7 @@
           <p:cNvPr id="24582" name="Rectangle 3">
             <a:extLst>
               <a:ext uri="{FF2B5EF4-FFF2-40B4-BE49-F238E27FC236}">
-                <a16:creationId xmlns:a16="http://schemas.microsoft.com/office/drawing/2014/main" id="{167FD2D0-6844-4584-A760-E7B1D7AB1B1A}"/>
+                <a16:creationId xmlns="" xmlns:a16="http://schemas.microsoft.com/office/drawing/2014/main" id="{167FD2D0-6844-4584-A760-E7B1D7AB1B1A}"/>
               </a:ext>
             </a:extLst>
           </p:cNvPr>
@@ -11794,13 +11237,19 @@
           </a:lstStyle>
           <a:p>
             <a:r>
-              <a:rPr lang="en-US" altLang="en-US" b="1">
+              <a:rPr lang="en-US" altLang="en-US" b="1" dirty="0">
                 <a:solidFill>
                   <a:schemeClr val="bg2"/>
                 </a:solidFill>
+                <a:hlinkClick r:id="rId4"/>
               </a:rPr>
               <a:t>https://github.com/h2oai/h2o4gpu/blob/master/examples/py/xgboost_simple_demo.ipynb</a:t>
             </a:r>
+            <a:endParaRPr lang="en-US" altLang="en-US" b="1" dirty="0">
+              <a:solidFill>
+                <a:schemeClr val="bg2"/>
+              </a:solidFill>
+            </a:endParaRPr>
           </a:p>
         </p:txBody>
       </p:sp>
@@ -11809,10 +11258,17 @@
   <p:clrMapOvr>
     <a:masterClrMapping/>
   </p:clrMapOvr>
+  <p:timing>
+    <p:tnLst>
+      <p:par>
+        <p:cTn id="1" dur="indefinite" restart="never" nodeType="tmRoot"/>
+      </p:par>
+    </p:tnLst>
+  </p:timing>
 </p:sld>
 </file>
 
-<file path=ppt/slides/slide6.xml><?xml version="1.0" encoding="utf-8"?>
+<file path=ppt/slides/slide5.xml><?xml version="1.0" encoding="utf-8"?>
 <p:sld xmlns:a="http://schemas.openxmlformats.org/drawingml/2006/main" xmlns:r="http://schemas.openxmlformats.org/officeDocument/2006/relationships" xmlns:p="http://schemas.openxmlformats.org/presentationml/2006/main">
   <p:cSld>
     <p:spTree>
@@ -11834,7 +11290,7 @@
           <p:cNvPr id="49153" name="Text Box 1" descr="TextBox 11">
             <a:extLst>
               <a:ext uri="{FF2B5EF4-FFF2-40B4-BE49-F238E27FC236}">
-                <a16:creationId xmlns:a16="http://schemas.microsoft.com/office/drawing/2014/main" id="{23EC6776-58BA-42D5-A039-36C3EBDF10A6}"/>
+                <a16:creationId xmlns="" xmlns:a16="http://schemas.microsoft.com/office/drawing/2014/main" id="{23EC6776-58BA-42D5-A039-36C3EBDF10A6}"/>
               </a:ext>
             </a:extLst>
           </p:cNvPr>
@@ -12033,7 +11489,7 @@
               <a:pPr eaLnBrk="1">
                 <a:defRPr/>
               </a:pPr>
-              <a:t>6</a:t>
+              <a:t>5</a:t>
             </a:fld>
             <a:endParaRPr lang="en-US" altLang="en-US" sz="600">
               <a:solidFill>
@@ -12051,7 +11507,7 @@
           <p:cNvPr id="49154" name="Picture 2" descr="GPU_H2O_GBM.png">
             <a:extLst>
               <a:ext uri="{FF2B5EF4-FFF2-40B4-BE49-F238E27FC236}">
-                <a16:creationId xmlns:a16="http://schemas.microsoft.com/office/drawing/2014/main" id="{65837065-8443-4CB0-B677-32BF4373C1D4}"/>
+                <a16:creationId xmlns="" xmlns:a16="http://schemas.microsoft.com/office/drawing/2014/main" id="{65837065-8443-4CB0-B677-32BF4373C1D4}"/>
               </a:ext>
             </a:extLst>
           </p:cNvPr>
@@ -12125,7 +11581,7 @@
             <a:hlinkClick r:id="rId3"/>
             <a:extLst>
               <a:ext uri="{FF2B5EF4-FFF2-40B4-BE49-F238E27FC236}">
-                <a16:creationId xmlns:a16="http://schemas.microsoft.com/office/drawing/2014/main" id="{81AD7104-344E-4767-A329-62FC9C99C1D8}"/>
+                <a16:creationId xmlns="" xmlns:a16="http://schemas.microsoft.com/office/drawing/2014/main" id="{81AD7104-344E-4767-A329-62FC9C99C1D8}"/>
               </a:ext>
             </a:extLst>
           </p:cNvPr>
@@ -12342,7 +11798,7 @@
           <p:cNvPr id="49156" name="Text Box 4">
             <a:extLst>
               <a:ext uri="{FF2B5EF4-FFF2-40B4-BE49-F238E27FC236}">
-                <a16:creationId xmlns:a16="http://schemas.microsoft.com/office/drawing/2014/main" id="{43AD7FD8-0A5B-4F24-91DD-A136331796B3}"/>
+                <a16:creationId xmlns="" xmlns:a16="http://schemas.microsoft.com/office/drawing/2014/main" id="{43AD7FD8-0A5B-4F24-91DD-A136331796B3}"/>
               </a:ext>
             </a:extLst>
           </p:cNvPr>
@@ -12425,7 +11881,7 @@
           <p:cNvPr id="49157" name="Line 5">
             <a:extLst>
               <a:ext uri="{FF2B5EF4-FFF2-40B4-BE49-F238E27FC236}">
-                <a16:creationId xmlns:a16="http://schemas.microsoft.com/office/drawing/2014/main" id="{9FA55DE9-4216-46CC-931F-2DDCE9BB56C2}"/>
+                <a16:creationId xmlns="" xmlns:a16="http://schemas.microsoft.com/office/drawing/2014/main" id="{9FA55DE9-4216-46CC-931F-2DDCE9BB56C2}"/>
               </a:ext>
             </a:extLst>
           </p:cNvPr>
@@ -12483,7 +11939,7 @@
           <p:cNvPr id="49158" name="Line 6">
             <a:extLst>
               <a:ext uri="{FF2B5EF4-FFF2-40B4-BE49-F238E27FC236}">
-                <a16:creationId xmlns:a16="http://schemas.microsoft.com/office/drawing/2014/main" id="{2DBF7024-BDBE-44A2-B4BF-56DCD8F1BBED}"/>
+                <a16:creationId xmlns="" xmlns:a16="http://schemas.microsoft.com/office/drawing/2014/main" id="{2DBF7024-BDBE-44A2-B4BF-56DCD8F1BBED}"/>
               </a:ext>
             </a:extLst>
           </p:cNvPr>
@@ -12541,7 +11997,7 @@
           <p:cNvPr id="49159" name="Line 7">
             <a:extLst>
               <a:ext uri="{FF2B5EF4-FFF2-40B4-BE49-F238E27FC236}">
-                <a16:creationId xmlns:a16="http://schemas.microsoft.com/office/drawing/2014/main" id="{2593DF02-41CA-4F90-8D20-158DBB2D2540}"/>
+                <a16:creationId xmlns="" xmlns:a16="http://schemas.microsoft.com/office/drawing/2014/main" id="{2593DF02-41CA-4F90-8D20-158DBB2D2540}"/>
               </a:ext>
             </a:extLst>
           </p:cNvPr>
@@ -12599,7 +12055,7 @@
           <p:cNvPr id="49160" name="Line 8">
             <a:extLst>
               <a:ext uri="{FF2B5EF4-FFF2-40B4-BE49-F238E27FC236}">
-                <a16:creationId xmlns:a16="http://schemas.microsoft.com/office/drawing/2014/main" id="{DC479F71-BA4B-467F-9A2F-161E41F96FAE}"/>
+                <a16:creationId xmlns="" xmlns:a16="http://schemas.microsoft.com/office/drawing/2014/main" id="{DC479F71-BA4B-467F-9A2F-161E41F96FAE}"/>
               </a:ext>
             </a:extLst>
           </p:cNvPr>
@@ -12657,7 +12113,7 @@
           <p:cNvPr id="49161" name="Line 9">
             <a:extLst>
               <a:ext uri="{FF2B5EF4-FFF2-40B4-BE49-F238E27FC236}">
-                <a16:creationId xmlns:a16="http://schemas.microsoft.com/office/drawing/2014/main" id="{5EFD1BBA-B0D2-48BA-9CA5-34D815A34997}"/>
+                <a16:creationId xmlns="" xmlns:a16="http://schemas.microsoft.com/office/drawing/2014/main" id="{5EFD1BBA-B0D2-48BA-9CA5-34D815A34997}"/>
               </a:ext>
             </a:extLst>
           </p:cNvPr>
@@ -12714,7 +12170,7 @@
           <p:cNvPr id="49162" name="Text Box 10">
             <a:extLst>
               <a:ext uri="{FF2B5EF4-FFF2-40B4-BE49-F238E27FC236}">
-                <a16:creationId xmlns:a16="http://schemas.microsoft.com/office/drawing/2014/main" id="{D024F4FB-46E6-4534-A747-D9B7A7342DB8}"/>
+                <a16:creationId xmlns="" xmlns:a16="http://schemas.microsoft.com/office/drawing/2014/main" id="{D024F4FB-46E6-4534-A747-D9B7A7342DB8}"/>
               </a:ext>
             </a:extLst>
           </p:cNvPr>
@@ -12797,7 +12253,7 @@
           <p:cNvPr id="49163" name="Text Box 11">
             <a:extLst>
               <a:ext uri="{FF2B5EF4-FFF2-40B4-BE49-F238E27FC236}">
-                <a16:creationId xmlns:a16="http://schemas.microsoft.com/office/drawing/2014/main" id="{C96C9E6E-4895-432D-9269-1D582FD86394}"/>
+                <a16:creationId xmlns="" xmlns:a16="http://schemas.microsoft.com/office/drawing/2014/main" id="{C96C9E6E-4895-432D-9269-1D582FD86394}"/>
               </a:ext>
             </a:extLst>
           </p:cNvPr>
@@ -12881,6 +12337,199 @@
     <a:masterClrMapping/>
   </p:clrMapOvr>
   <p:transition spd="med"/>
+  <p:timing>
+    <p:tnLst>
+      <p:par>
+        <p:cTn id="1" dur="indefinite" restart="never" nodeType="tmRoot"/>
+      </p:par>
+    </p:tnLst>
+  </p:timing>
+</p:sld>
+</file>
+
+<file path=ppt/slides/slide6.xml><?xml version="1.0" encoding="utf-8"?>
+<p:sld xmlns:a="http://schemas.openxmlformats.org/drawingml/2006/main" xmlns:r="http://schemas.openxmlformats.org/officeDocument/2006/relationships" xmlns:p="http://schemas.openxmlformats.org/presentationml/2006/main">
+  <p:cSld>
+    <p:spTree>
+      <p:nvGrpSpPr>
+        <p:cNvPr id="1" name=""/>
+        <p:cNvGrpSpPr/>
+        <p:nvPr/>
+      </p:nvGrpSpPr>
+      <p:grpSpPr>
+        <a:xfrm>
+          <a:off x="0" y="0"/>
+          <a:ext cx="0" cy="0"/>
+          <a:chOff x="0" y="0"/>
+          <a:chExt cx="0" cy="0"/>
+        </a:xfrm>
+      </p:grpSpPr>
+      <p:sp>
+        <p:nvSpPr>
+          <p:cNvPr id="2" name="Title 1">
+            <a:extLst>
+              <a:ext uri="{FF2B5EF4-FFF2-40B4-BE49-F238E27FC236}">
+                <a16:creationId xmlns="" xmlns:a16="http://schemas.microsoft.com/office/drawing/2014/main" id="{28A79C2C-C552-4870-A673-B916345D2995}"/>
+              </a:ext>
+            </a:extLst>
+          </p:cNvPr>
+          <p:cNvSpPr>
+            <a:spLocks noGrp="1"/>
+          </p:cNvSpPr>
+          <p:nvPr>
+            <p:ph type="title"/>
+          </p:nvPr>
+        </p:nvSpPr>
+        <p:spPr/>
+        <p:txBody>
+          <a:bodyPr/>
+          <a:lstStyle/>
+          <a:p>
+            <a:pPr algn="ctr">
+              <a:defRPr/>
+            </a:pPr>
+            <a:r>
+              <a:rPr lang="en-US" dirty="0"/>
+              <a:t>CPU vs. GPU on Higgs (Classification)</a:t>
+            </a:r>
+          </a:p>
+        </p:txBody>
+      </p:sp>
+      <p:sp>
+        <p:nvSpPr>
+          <p:cNvPr id="26627" name="Content Placeholder 2">
+            <a:extLst>
+              <a:ext uri="{FF2B5EF4-FFF2-40B4-BE49-F238E27FC236}">
+                <a16:creationId xmlns="" xmlns:a16="http://schemas.microsoft.com/office/drawing/2014/main" id="{0A90C9B5-31A0-4313-83C9-8C563CADD980}"/>
+              </a:ext>
+            </a:extLst>
+          </p:cNvPr>
+          <p:cNvSpPr>
+            <a:spLocks noGrp="1" noChangeArrowheads="1"/>
+          </p:cNvSpPr>
+          <p:nvPr>
+            <p:ph idx="1"/>
+          </p:nvPr>
+        </p:nvSpPr>
+        <p:spPr bwMode="auto">
+          <a:xfrm>
+            <a:off x="685800" y="5412278"/>
+            <a:ext cx="9464675" cy="644525"/>
+          </a:xfrm>
+          <a:noFill/>
+          <a:extLst>
+            <a:ext uri="{909E8E84-426E-40DD-AFC4-6F175D3DCCD1}">
+              <a14:hiddenFill xmlns:a14="http://schemas.microsoft.com/office/drawing/2010/main">
+                <a:solidFill>
+                  <a:srgbClr val="FFFFFF"/>
+                </a:solidFill>
+              </a14:hiddenFill>
+            </a:ext>
+            <a:ext uri="{91240B29-F687-4F45-9708-019B960494DF}">
+              <a14:hiddenLine xmlns:a14="http://schemas.microsoft.com/office/drawing/2010/main" w="9525">
+                <a:solidFill>
+                  <a:srgbClr val="000000"/>
+                </a:solidFill>
+                <a:miter lim="800000"/>
+                <a:headEnd/>
+                <a:tailEnd/>
+              </a14:hiddenLine>
+            </a:ext>
+          </a:extLst>
+        </p:spPr>
+        <p:txBody>
+          <a:bodyPr vert="horz" wrap="square" lIns="91440" tIns="45720" rIns="91440" bIns="45720" numCol="1" anchor="t" anchorCtr="0" compatLnSpc="1">
+            <a:prstTxWarp prst="textNoShape">
+              <a:avLst/>
+            </a:prstTxWarp>
+          </a:bodyPr>
+          <a:lstStyle/>
+          <a:p>
+            <a:pPr marL="0" indent="0">
+              <a:buNone/>
+            </a:pPr>
+            <a:r>
+              <a:rPr lang="en-US" altLang="en-US" dirty="0">
+                <a:hlinkClick r:id="rId2"/>
+              </a:rPr>
+              <a:t>https://devblogs.nvidia.com/parallelforall/gradient-boosting-decision-trees-xgboost-cuda/</a:t>
+            </a:r>
+            <a:endParaRPr lang="en-US" altLang="en-US" dirty="0"/>
+          </a:p>
+        </p:txBody>
+      </p:sp>
+      <p:pic>
+        <p:nvPicPr>
+          <p:cNvPr id="26628" name="Picture 2" descr="Figure 3. Test error over time for the Higgs dataset, 1000 boosting iterations.">
+            <a:extLst>
+              <a:ext uri="{FF2B5EF4-FFF2-40B4-BE49-F238E27FC236}">
+                <a16:creationId xmlns="" xmlns:a16="http://schemas.microsoft.com/office/drawing/2014/main" id="{BED3BB08-C647-4F20-9D0E-7ECFCE58516F}"/>
+              </a:ext>
+            </a:extLst>
+          </p:cNvPr>
+          <p:cNvPicPr>
+            <a:picLocks noChangeAspect="1" noChangeArrowheads="1"/>
+          </p:cNvPicPr>
+          <p:nvPr/>
+        </p:nvPicPr>
+        <p:blipFill>
+          <a:blip r:embed="rId3">
+            <a:extLst>
+              <a:ext uri="{28A0092B-C50C-407E-A947-70E740481C1C}">
+                <a14:useLocalDpi xmlns:a14="http://schemas.microsoft.com/office/drawing/2010/main" val="0"/>
+              </a:ext>
+            </a:extLst>
+          </a:blip>
+          <a:srcRect/>
+          <a:stretch>
+            <a:fillRect/>
+          </a:stretch>
+        </p:blipFill>
+        <p:spPr bwMode="auto">
+          <a:xfrm>
+            <a:off x="2286000" y="1168523"/>
+            <a:ext cx="5905500" cy="4256088"/>
+          </a:xfrm>
+          <a:prstGeom prst="rect">
+            <a:avLst/>
+          </a:prstGeom>
+          <a:noFill/>
+          <a:ln>
+            <a:noFill/>
+          </a:ln>
+          <a:extLst>
+            <a:ext uri="{909E8E84-426E-40DD-AFC4-6F175D3DCCD1}">
+              <a14:hiddenFill xmlns:a14="http://schemas.microsoft.com/office/drawing/2010/main">
+                <a:solidFill>
+                  <a:srgbClr val="FFFFFF"/>
+                </a:solidFill>
+              </a14:hiddenFill>
+            </a:ext>
+            <a:ext uri="{91240B29-F687-4F45-9708-019B960494DF}">
+              <a14:hiddenLine xmlns:a14="http://schemas.microsoft.com/office/drawing/2010/main" w="9525">
+                <a:solidFill>
+                  <a:srgbClr val="000000"/>
+                </a:solidFill>
+                <a:miter lim="800000"/>
+                <a:headEnd/>
+                <a:tailEnd/>
+              </a14:hiddenLine>
+            </a:ext>
+          </a:extLst>
+        </p:spPr>
+      </p:pic>
+    </p:spTree>
+  </p:cSld>
+  <p:clrMapOvr>
+    <a:masterClrMapping/>
+  </p:clrMapOvr>
+  <p:timing>
+    <p:tnLst>
+      <p:par>
+        <p:cTn id="1" dur="indefinite" restart="never" nodeType="tmRoot"/>
+      </p:par>
+    </p:tnLst>
+  </p:timing>
 </p:sld>
 </file>
 
@@ -12906,7 +12555,7 @@
           <p:cNvPr id="2" name="Title 1">
             <a:extLst>
               <a:ext uri="{FF2B5EF4-FFF2-40B4-BE49-F238E27FC236}">
-                <a16:creationId xmlns:a16="http://schemas.microsoft.com/office/drawing/2014/main" id="{28A79C2C-C552-4870-A673-B916345D2995}"/>
+                <a16:creationId xmlns="" xmlns:a16="http://schemas.microsoft.com/office/drawing/2014/main" id="{06694A1E-CC31-4C5D-A027-49D2853C13B2}"/>
               </a:ext>
             </a:extLst>
           </p:cNvPr>
@@ -12922,27 +12571,38 @@
           <a:bodyPr/>
           <a:lstStyle/>
           <a:p>
-            <a:pPr algn="ctr">
+            <a:pPr>
               <a:defRPr/>
             </a:pPr>
             <a:r>
-              <a:rPr lang="en-US" dirty="0"/>
-              <a:t>CPU vs. GPU on Higgs (Classification)</a:t>
-            </a:r>
+              <a:rPr lang="en-US" dirty="0">
+                <a:sym typeface="Arial" charset="0"/>
+              </a:rPr>
+              <a:t>K-Means on </a:t>
+            </a:r>
+            <a:r>
+              <a:rPr lang="en-US" dirty="0" smtClean="0">
+                <a:sym typeface="Arial" charset="0"/>
+              </a:rPr>
+              <a:t>H2O4GPU</a:t>
+            </a:r>
+            <a:endParaRPr lang="en-US" dirty="0">
+              <a:sym typeface="Arial" charset="0"/>
+            </a:endParaRPr>
           </a:p>
         </p:txBody>
       </p:sp>
       <p:sp>
         <p:nvSpPr>
-          <p:cNvPr id="26627" name="Content Placeholder 2">
+          <p:cNvPr id="27651" name="Content Placeholder 2">
             <a:extLst>
               <a:ext uri="{FF2B5EF4-FFF2-40B4-BE49-F238E27FC236}">
-                <a16:creationId xmlns:a16="http://schemas.microsoft.com/office/drawing/2014/main" id="{0A90C9B5-31A0-4313-83C9-8C563CADD980}"/>
+                <a16:creationId xmlns="" xmlns:a16="http://schemas.microsoft.com/office/drawing/2014/main" id="{7F9DE394-8627-4EC1-A8B5-88FA911E2F1F}"/>
               </a:ext>
             </a:extLst>
           </p:cNvPr>
           <p:cNvSpPr>
-            <a:spLocks noGrp="1" noChangeArrowheads="1"/>
+            <a:spLocks noGrp="1"/>
           </p:cNvSpPr>
           <p:nvPr>
             <p:ph idx="1"/>
@@ -12978,75 +12638,90 @@
           </a:bodyPr>
           <a:lstStyle/>
           <a:p>
+            <a:r>
+              <a:rPr lang="en-US" altLang="en-US"/>
+              <a:t>Based upon NVIDIA prototype of K-Means algorithm in CUDA</a:t>
+            </a:r>
+          </a:p>
+          <a:p>
+            <a:endParaRPr lang="en-US" altLang="en-US"/>
+          </a:p>
+          <a:p>
+            <a:r>
+              <a:rPr lang="en-US" altLang="en-US"/>
+              <a:t>Improvements to original implementation:</a:t>
+            </a:r>
+          </a:p>
+          <a:p>
+            <a:endParaRPr lang="en-US" altLang="en-US"/>
+          </a:p>
+          <a:p>
+            <a:pPr lvl="1"/>
+            <a:r>
+              <a:rPr lang="en-US" altLang="en-US"/>
+              <a:t>Significantly faster than scikit-learn implementation (50x)</a:t>
+            </a:r>
+          </a:p>
+          <a:p>
+            <a:pPr lvl="1"/>
+            <a:endParaRPr lang="en-US" altLang="en-US"/>
+          </a:p>
+          <a:p>
+            <a:pPr lvl="1"/>
+            <a:r>
+              <a:rPr lang="en-US" altLang="en-US"/>
+              <a:t>Significantly faster than other GPU implementations (</a:t>
+            </a:r>
+            <a:r>
+              <a:rPr lang="en-US" altLang="en-US">
+                <a:hlinkClick r:id="rId2"/>
+              </a:rPr>
+              <a:t>https://github.com/src-d/kmcuda</a:t>
+            </a:r>
+            <a:r>
+              <a:rPr lang="en-US" altLang="en-US"/>
+              <a:t>) (5x-10x)</a:t>
+            </a:r>
+          </a:p>
+          <a:p>
+            <a:pPr lvl="1"/>
+            <a:endParaRPr lang="en-US" altLang="en-US"/>
+          </a:p>
+          <a:p>
+            <a:pPr lvl="1"/>
+            <a:r>
+              <a:rPr lang="en-US" altLang="en-US"/>
+              <a:t>Various bug fixes</a:t>
+            </a:r>
+          </a:p>
+          <a:p>
+            <a:pPr lvl="1"/>
+            <a:endParaRPr lang="en-US" altLang="en-US"/>
+          </a:p>
+          <a:p>
+            <a:pPr lvl="1"/>
+            <a:r>
+              <a:rPr lang="en-US" altLang="en-US"/>
+              <a:t>Supports multiple GPUs</a:t>
+            </a:r>
+          </a:p>
+          <a:p>
             <a:endParaRPr lang="en-US" altLang="en-US"/>
           </a:p>
         </p:txBody>
       </p:sp>
-      <p:pic>
-        <p:nvPicPr>
-          <p:cNvPr id="26628" name="Picture 2" descr="Figure 3. Test error over time for the Higgs dataset, 1000 boosting iterations.">
-            <a:extLst>
-              <a:ext uri="{FF2B5EF4-FFF2-40B4-BE49-F238E27FC236}">
-                <a16:creationId xmlns:a16="http://schemas.microsoft.com/office/drawing/2014/main" id="{BED3BB08-C647-4F20-9D0E-7ECFCE58516F}"/>
-              </a:ext>
-            </a:extLst>
-          </p:cNvPr>
-          <p:cNvPicPr>
-            <a:picLocks noChangeAspect="1" noChangeArrowheads="1"/>
-          </p:cNvPicPr>
-          <p:nvPr/>
-        </p:nvPicPr>
-        <p:blipFill>
-          <a:blip r:embed="rId2">
-            <a:extLst>
-              <a:ext uri="{28A0092B-C50C-407E-A947-70E740481C1C}">
-                <a14:useLocalDpi xmlns:a14="http://schemas.microsoft.com/office/drawing/2010/main" val="0"/>
-              </a:ext>
-            </a:extLst>
-          </a:blip>
-          <a:srcRect/>
-          <a:stretch>
-            <a:fillRect/>
-          </a:stretch>
-        </p:blipFill>
-        <p:spPr bwMode="auto">
-          <a:xfrm>
-            <a:off x="2209800" y="1473200"/>
-            <a:ext cx="5905500" cy="4256088"/>
-          </a:xfrm>
-          <a:prstGeom prst="rect">
-            <a:avLst/>
-          </a:prstGeom>
-          <a:noFill/>
-          <a:ln>
-            <a:noFill/>
-          </a:ln>
-          <a:extLst>
-            <a:ext uri="{909E8E84-426E-40DD-AFC4-6F175D3DCCD1}">
-              <a14:hiddenFill xmlns:a14="http://schemas.microsoft.com/office/drawing/2010/main">
-                <a:solidFill>
-                  <a:srgbClr val="FFFFFF"/>
-                </a:solidFill>
-              </a14:hiddenFill>
-            </a:ext>
-            <a:ext uri="{91240B29-F687-4F45-9708-019B960494DF}">
-              <a14:hiddenLine xmlns:a14="http://schemas.microsoft.com/office/drawing/2010/main" w="9525">
-                <a:solidFill>
-                  <a:srgbClr val="000000"/>
-                </a:solidFill>
-                <a:miter lim="800000"/>
-                <a:headEnd/>
-                <a:tailEnd/>
-              </a14:hiddenLine>
-            </a:ext>
-          </a:extLst>
-        </p:spPr>
-      </p:pic>
     </p:spTree>
   </p:cSld>
   <p:clrMapOvr>
     <a:masterClrMapping/>
   </p:clrMapOvr>
+  <p:timing>
+    <p:tnLst>
+      <p:par>
+        <p:cTn id="1" dur="indefinite" restart="never" nodeType="tmRoot"/>
+      </p:par>
+    </p:tnLst>
+  </p:timing>
 </p:sld>
 </file>
 
@@ -13072,7 +12747,7 @@
           <p:cNvPr id="2" name="Title 1">
             <a:extLst>
               <a:ext uri="{FF2B5EF4-FFF2-40B4-BE49-F238E27FC236}">
-                <a16:creationId xmlns:a16="http://schemas.microsoft.com/office/drawing/2014/main" id="{06694A1E-CC31-4C5D-A027-49D2853C13B2}"/>
+                <a16:creationId xmlns="" xmlns:a16="http://schemas.microsoft.com/office/drawing/2014/main" id="{CEE2AC0B-5D1F-447C-97EF-C007B27E59F2}"/>
               </a:ext>
             </a:extLst>
           </p:cNvPr>
@@ -13092,235 +12767,9 @@
               <a:defRPr/>
             </a:pPr>
             <a:r>
-              <a:rPr lang="en-US" dirty="0">
-                <a:sym typeface="Arial" charset="0"/>
-              </a:rPr>
-              <a:t>K-Means on H2O4gpu</a:t>
-            </a:r>
-          </a:p>
-        </p:txBody>
-      </p:sp>
-      <p:sp>
-        <p:nvSpPr>
-          <p:cNvPr id="27651" name="Content Placeholder 2">
-            <a:extLst>
-              <a:ext uri="{FF2B5EF4-FFF2-40B4-BE49-F238E27FC236}">
-                <a16:creationId xmlns:a16="http://schemas.microsoft.com/office/drawing/2014/main" id="{7F9DE394-8627-4EC1-A8B5-88FA911E2F1F}"/>
-              </a:ext>
-            </a:extLst>
-          </p:cNvPr>
-          <p:cNvSpPr>
-            <a:spLocks noGrp="1"/>
-          </p:cNvSpPr>
-          <p:nvPr>
-            <p:ph idx="1"/>
-          </p:nvPr>
-        </p:nvSpPr>
-        <p:spPr bwMode="auto">
-          <a:noFill/>
-          <a:extLst>
-            <a:ext uri="{909E8E84-426E-40DD-AFC4-6F175D3DCCD1}">
-              <a14:hiddenFill xmlns:a14="http://schemas.microsoft.com/office/drawing/2010/main">
-                <a:solidFill>
-                  <a:srgbClr val="FFFFFF"/>
-                </a:solidFill>
-              </a14:hiddenFill>
-            </a:ext>
-            <a:ext uri="{91240B29-F687-4F45-9708-019B960494DF}">
-              <a14:hiddenLine xmlns:a14="http://schemas.microsoft.com/office/drawing/2010/main" w="9525">
-                <a:solidFill>
-                  <a:srgbClr val="000000"/>
-                </a:solidFill>
-                <a:miter lim="800000"/>
-                <a:headEnd/>
-                <a:tailEnd/>
-              </a14:hiddenLine>
-            </a:ext>
-          </a:extLst>
-        </p:spPr>
-        <p:txBody>
-          <a:bodyPr vert="horz" wrap="square" lIns="91440" tIns="45720" rIns="91440" bIns="45720" numCol="1" anchor="t" anchorCtr="0" compatLnSpc="1">
-            <a:prstTxWarp prst="textNoShape">
-              <a:avLst/>
-            </a:prstTxWarp>
-          </a:bodyPr>
-          <a:lstStyle/>
-          <a:p>
-            <a:r>
-              <a:rPr lang="en-US" altLang="en-US"/>
-              <a:t>Based upon NVIDIA prototype of K-Means algorithm in CUDA</a:t>
-            </a:r>
-          </a:p>
-          <a:p>
-            <a:endParaRPr lang="en-US" altLang="en-US"/>
-          </a:p>
-          <a:p>
-            <a:r>
-              <a:rPr lang="en-US" altLang="en-US"/>
-              <a:t>Improvements to original implementation:</a:t>
-            </a:r>
-          </a:p>
-          <a:p>
-            <a:endParaRPr lang="en-US" altLang="en-US"/>
-          </a:p>
-          <a:p>
-            <a:pPr lvl="1"/>
-            <a:r>
-              <a:rPr lang="en-US" altLang="en-US"/>
-              <a:t>Significantly faster than scikit-learn implementation (50x)</a:t>
-            </a:r>
-          </a:p>
-          <a:p>
-            <a:pPr lvl="1"/>
-            <a:endParaRPr lang="en-US" altLang="en-US"/>
-          </a:p>
-          <a:p>
-            <a:pPr lvl="1"/>
-            <a:r>
-              <a:rPr lang="en-US" altLang="en-US"/>
-              <a:t>Significantly faster than other GPU implementations (</a:t>
-            </a:r>
-            <a:r>
-              <a:rPr lang="en-US" altLang="en-US">
-                <a:hlinkClick r:id="rId2"/>
-              </a:rPr>
-              <a:t>https://github.com/src-d/kmcuda</a:t>
-            </a:r>
-            <a:r>
-              <a:rPr lang="en-US" altLang="en-US"/>
-              <a:t>) (5x-10x)</a:t>
-            </a:r>
-          </a:p>
-          <a:p>
-            <a:pPr lvl="1"/>
-            <a:endParaRPr lang="en-US" altLang="en-US"/>
-          </a:p>
-          <a:p>
-            <a:pPr lvl="1"/>
-            <a:r>
-              <a:rPr lang="en-US" altLang="en-US"/>
-              <a:t>Various bug fixes</a:t>
-            </a:r>
-          </a:p>
-          <a:p>
-            <a:pPr lvl="1"/>
-            <a:endParaRPr lang="en-US" altLang="en-US"/>
-          </a:p>
-          <a:p>
-            <a:pPr lvl="1"/>
-            <a:r>
-              <a:rPr lang="en-US" altLang="en-US"/>
-              <a:t>Supports multiple GPUs</a:t>
-            </a:r>
-          </a:p>
-          <a:p>
-            <a:endParaRPr lang="en-US" altLang="en-US"/>
-          </a:p>
-        </p:txBody>
-      </p:sp>
-    </p:spTree>
-  </p:cSld>
-  <p:clrMapOvr>
-    <a:masterClrMapping/>
-  </p:clrMapOvr>
-</p:sld>
-</file>
-
-<file path=ppt/slides/slide9.xml><?xml version="1.0" encoding="utf-8"?>
-<p:sld xmlns:a="http://schemas.openxmlformats.org/drawingml/2006/main" xmlns:r="http://schemas.openxmlformats.org/officeDocument/2006/relationships" xmlns:p="http://schemas.openxmlformats.org/presentationml/2006/main">
-  <p:cSld>
-    <p:spTree>
-      <p:nvGrpSpPr>
-        <p:cNvPr id="1" name=""/>
-        <p:cNvGrpSpPr/>
-        <p:nvPr/>
-      </p:nvGrpSpPr>
-      <p:grpSpPr>
-        <a:xfrm>
-          <a:off x="0" y="0"/>
-          <a:ext cx="0" cy="0"/>
-          <a:chOff x="0" y="0"/>
-          <a:chExt cx="0" cy="0"/>
-        </a:xfrm>
-      </p:grpSpPr>
-      <p:sp>
-        <p:nvSpPr>
-          <p:cNvPr id="2" name="Title 1">
-            <a:extLst>
-              <a:ext uri="{FF2B5EF4-FFF2-40B4-BE49-F238E27FC236}">
-                <a16:creationId xmlns:a16="http://schemas.microsoft.com/office/drawing/2014/main" id="{CEE2AC0B-5D1F-447C-97EF-C007B27E59F2}"/>
-              </a:ext>
-            </a:extLst>
-          </p:cNvPr>
-          <p:cNvSpPr>
-            <a:spLocks noGrp="1"/>
-          </p:cNvSpPr>
-          <p:nvPr>
-            <p:ph type="title"/>
-          </p:nvPr>
-        </p:nvSpPr>
-        <p:spPr/>
-        <p:txBody>
-          <a:bodyPr/>
-          <a:lstStyle/>
-          <a:p>
-            <a:pPr>
-              <a:defRPr/>
-            </a:pPr>
-            <a:r>
               <a:rPr lang="en-US" dirty="0"/>
               <a:t>K-Means</a:t>
             </a:r>
-          </a:p>
-        </p:txBody>
-      </p:sp>
-      <p:sp>
-        <p:nvSpPr>
-          <p:cNvPr id="28675" name="Content Placeholder 2">
-            <a:extLst>
-              <a:ext uri="{FF2B5EF4-FFF2-40B4-BE49-F238E27FC236}">
-                <a16:creationId xmlns:a16="http://schemas.microsoft.com/office/drawing/2014/main" id="{96203B34-5DFA-487E-A8F4-2FF37A35407C}"/>
-              </a:ext>
-            </a:extLst>
-          </p:cNvPr>
-          <p:cNvSpPr>
-            <a:spLocks noGrp="1" noChangeArrowheads="1"/>
-          </p:cNvSpPr>
-          <p:nvPr>
-            <p:ph idx="1"/>
-          </p:nvPr>
-        </p:nvSpPr>
-        <p:spPr bwMode="auto">
-          <a:noFill/>
-          <a:extLst>
-            <a:ext uri="{909E8E84-426E-40DD-AFC4-6F175D3DCCD1}">
-              <a14:hiddenFill xmlns:a14="http://schemas.microsoft.com/office/drawing/2010/main">
-                <a:solidFill>
-                  <a:srgbClr val="FFFFFF"/>
-                </a:solidFill>
-              </a14:hiddenFill>
-            </a:ext>
-            <a:ext uri="{91240B29-F687-4F45-9708-019B960494DF}">
-              <a14:hiddenLine xmlns:a14="http://schemas.microsoft.com/office/drawing/2010/main" w="9525">
-                <a:solidFill>
-                  <a:srgbClr val="000000"/>
-                </a:solidFill>
-                <a:miter lim="800000"/>
-                <a:headEnd/>
-                <a:tailEnd/>
-              </a14:hiddenLine>
-            </a:ext>
-          </a:extLst>
-        </p:spPr>
-        <p:txBody>
-          <a:bodyPr vert="horz" wrap="square" lIns="91440" tIns="45720" rIns="91440" bIns="45720" numCol="1" anchor="t" anchorCtr="0" compatLnSpc="1">
-            <a:prstTxWarp prst="textNoShape">
-              <a:avLst/>
-            </a:prstTxWarp>
-          </a:bodyPr>
-          <a:lstStyle/>
-          <a:p>
-            <a:endParaRPr lang="en-US" altLang="en-US"/>
           </a:p>
         </p:txBody>
       </p:sp>
@@ -13329,7 +12778,7 @@
           <p:cNvPr id="28676" name="Picture 5">
             <a:extLst>
               <a:ext uri="{FF2B5EF4-FFF2-40B4-BE49-F238E27FC236}">
-                <a16:creationId xmlns:a16="http://schemas.microsoft.com/office/drawing/2014/main" id="{774CC64F-628C-4FA4-8662-A0699BF36C8B}"/>
+                <a16:creationId xmlns="" xmlns:a16="http://schemas.microsoft.com/office/drawing/2014/main" id="{774CC64F-628C-4FA4-8662-A0699BF36C8B}"/>
               </a:ext>
             </a:extLst>
           </p:cNvPr>
@@ -13389,7 +12838,7 @@
           <p:cNvPr id="28677" name="Picture 6">
             <a:extLst>
               <a:ext uri="{FF2B5EF4-FFF2-40B4-BE49-F238E27FC236}">
-                <a16:creationId xmlns:a16="http://schemas.microsoft.com/office/drawing/2014/main" id="{40C5C251-F0E8-4564-AC52-1007AB1B22DF}"/>
+                <a16:creationId xmlns="" xmlns:a16="http://schemas.microsoft.com/office/drawing/2014/main" id="{40C5C251-F0E8-4564-AC52-1007AB1B22DF}"/>
               </a:ext>
             </a:extLst>
           </p:cNvPr>
@@ -13449,7 +12898,7 @@
           <p:cNvPr id="28678" name="Picture 7">
             <a:extLst>
               <a:ext uri="{FF2B5EF4-FFF2-40B4-BE49-F238E27FC236}">
-                <a16:creationId xmlns:a16="http://schemas.microsoft.com/office/drawing/2014/main" id="{11A95125-AAD3-4929-983E-27B9ADCCD450}"/>
+                <a16:creationId xmlns="" xmlns:a16="http://schemas.microsoft.com/office/drawing/2014/main" id="{11A95125-AAD3-4929-983E-27B9ADCCD450}"/>
               </a:ext>
             </a:extLst>
           </p:cNvPr>
@@ -13509,7 +12958,7 @@
           <p:cNvPr id="28679" name="Rectangle 8">
             <a:extLst>
               <a:ext uri="{FF2B5EF4-FFF2-40B4-BE49-F238E27FC236}">
-                <a16:creationId xmlns:a16="http://schemas.microsoft.com/office/drawing/2014/main" id="{A5C86A6B-E9C5-45B4-804F-8A37A92789D3}"/>
+                <a16:creationId xmlns="" xmlns:a16="http://schemas.microsoft.com/office/drawing/2014/main" id="{A5C86A6B-E9C5-45B4-804F-8A37A92789D3}"/>
               </a:ext>
             </a:extLst>
           </p:cNvPr>
@@ -13681,13 +13130,19 @@
           </a:lstStyle>
           <a:p>
             <a:r>
-              <a:rPr lang="en-US" altLang="en-US" b="1">
+              <a:rPr lang="en-US" altLang="en-US" b="1" dirty="0">
                 <a:solidFill>
                   <a:schemeClr val="bg2"/>
                 </a:solidFill>
+                <a:hlinkClick r:id="rId5"/>
               </a:rPr>
               <a:t>https://github.com/h2oai/h2o4gpu/blob/master/examples/py/demos/H2O4GPU_KMeans_Images.ipynb</a:t>
             </a:r>
+            <a:endParaRPr lang="en-US" altLang="en-US" b="1" dirty="0">
+              <a:solidFill>
+                <a:schemeClr val="bg2"/>
+              </a:solidFill>
+            </a:endParaRPr>
           </a:p>
         </p:txBody>
       </p:sp>
@@ -13696,6 +13151,329 @@
   <p:clrMapOvr>
     <a:masterClrMapping/>
   </p:clrMapOvr>
+  <p:timing>
+    <p:tnLst>
+      <p:par>
+        <p:cTn id="1" dur="indefinite" restart="never" nodeType="tmRoot"/>
+      </p:par>
+    </p:tnLst>
+  </p:timing>
+</p:sld>
+</file>
+
+<file path=ppt/slides/slide9.xml><?xml version="1.0" encoding="utf-8"?>
+<p:sld xmlns:a="http://schemas.openxmlformats.org/drawingml/2006/main" xmlns:r="http://schemas.openxmlformats.org/officeDocument/2006/relationships" xmlns:p="http://schemas.openxmlformats.org/presentationml/2006/main">
+  <p:cSld>
+    <p:spTree>
+      <p:nvGrpSpPr>
+        <p:cNvPr id="1" name=""/>
+        <p:cNvGrpSpPr/>
+        <p:nvPr/>
+      </p:nvGrpSpPr>
+      <p:grpSpPr>
+        <a:xfrm>
+          <a:off x="0" y="0"/>
+          <a:ext cx="0" cy="0"/>
+          <a:chOff x="0" y="0"/>
+          <a:chExt cx="0" cy="0"/>
+        </a:xfrm>
+      </p:grpSpPr>
+      <p:sp>
+        <p:nvSpPr>
+          <p:cNvPr id="50177" name="Text Box 1" descr="TextBox 11">
+            <a:extLst>
+              <a:ext uri="{FF2B5EF4-FFF2-40B4-BE49-F238E27FC236}">
+                <a16:creationId xmlns="" xmlns:a16="http://schemas.microsoft.com/office/drawing/2014/main" id="{9BB845AC-699F-4EB2-B34D-6C555ECA4309}"/>
+              </a:ext>
+            </a:extLst>
+          </p:cNvPr>
+          <p:cNvSpPr txBox="1">
+            <a:spLocks/>
+          </p:cNvSpPr>
+          <p:nvPr/>
+        </p:nvSpPr>
+        <p:spPr bwMode="auto">
+          <a:xfrm>
+            <a:off x="582613" y="6018213"/>
+            <a:ext cx="127000" cy="127000"/>
+          </a:xfrm>
+          <a:prstGeom prst="rect">
+            <a:avLst/>
+          </a:prstGeom>
+          <a:noFill/>
+          <a:ln>
+            <a:noFill/>
+          </a:ln>
+          <a:effectLst/>
+          <a:extLst>
+            <a:ext uri="{909E8E84-426E-40DD-AFC4-6F175D3DCCD1}">
+              <a14:hiddenFill xmlns:a14="http://schemas.microsoft.com/office/drawing/2010/main">
+                <a:solidFill>
+                  <a:srgbClr val="FFFFFF"/>
+                </a:solidFill>
+              </a14:hiddenFill>
+            </a:ext>
+            <a:ext uri="{91240B29-F687-4F45-9708-019B960494DF}">
+              <a14:hiddenLine xmlns:a14="http://schemas.microsoft.com/office/drawing/2010/main" w="12700" cap="flat" cmpd="sng">
+                <a:solidFill>
+                  <a:srgbClr val="000000"/>
+                </a:solidFill>
+                <a:prstDash val="solid"/>
+                <a:miter lim="400000"/>
+                <a:headEnd type="none" w="med" len="med"/>
+                <a:tailEnd type="none" w="med" len="med"/>
+              </a14:hiddenLine>
+            </a:ext>
+            <a:ext uri="{AF507438-7753-43E0-B8FC-AC1667EBCBE1}">
+              <a14:hiddenEffects xmlns:a14="http://schemas.microsoft.com/office/drawing/2010/main">
+                <a:effectLst>
+                  <a:outerShdw blurRad="63500" dist="38099" dir="2700000" algn="ctr" rotWithShape="0">
+                    <a:srgbClr val="000000">
+                      <a:alpha val="74998"/>
+                    </a:srgbClr>
+                  </a:outerShdw>
+                </a:effectLst>
+              </a14:hiddenEffects>
+            </a:ext>
+          </a:extLst>
+        </p:spPr>
+        <p:txBody>
+          <a:bodyPr wrap="none" lIns="0" tIns="0" rIns="0" bIns="0" anchor="ctr">
+            <a:spAutoFit/>
+          </a:bodyPr>
+          <a:lstStyle>
+            <a:lvl1pPr>
+              <a:defRPr>
+                <a:solidFill>
+                  <a:srgbClr val="6F6F6F"/>
+                </a:solidFill>
+                <a:latin typeface="Trebuchet MS" panose="020B0603020202020204" pitchFamily="34" charset="0"/>
+                <a:ea typeface="Trebuchet MS" panose="020B0603020202020204" pitchFamily="34" charset="0"/>
+                <a:cs typeface="Trebuchet MS" panose="020B0603020202020204" pitchFamily="34" charset="0"/>
+                <a:sym typeface="Trebuchet MS" panose="020B0603020202020204" pitchFamily="34" charset="0"/>
+              </a:defRPr>
+            </a:lvl1pPr>
+            <a:lvl2pPr marL="742950" indent="-285750">
+              <a:defRPr>
+                <a:solidFill>
+                  <a:srgbClr val="6F6F6F"/>
+                </a:solidFill>
+                <a:latin typeface="Trebuchet MS" panose="020B0603020202020204" pitchFamily="34" charset="0"/>
+                <a:ea typeface="Trebuchet MS" panose="020B0603020202020204" pitchFamily="34" charset="0"/>
+                <a:cs typeface="Trebuchet MS" panose="020B0603020202020204" pitchFamily="34" charset="0"/>
+                <a:sym typeface="Trebuchet MS" panose="020B0603020202020204" pitchFamily="34" charset="0"/>
+              </a:defRPr>
+            </a:lvl2pPr>
+            <a:lvl3pPr marL="1143000" indent="-228600">
+              <a:defRPr>
+                <a:solidFill>
+                  <a:srgbClr val="6F6F6F"/>
+                </a:solidFill>
+                <a:latin typeface="Trebuchet MS" panose="020B0603020202020204" pitchFamily="34" charset="0"/>
+                <a:ea typeface="Trebuchet MS" panose="020B0603020202020204" pitchFamily="34" charset="0"/>
+                <a:cs typeface="Trebuchet MS" panose="020B0603020202020204" pitchFamily="34" charset="0"/>
+                <a:sym typeface="Trebuchet MS" panose="020B0603020202020204" pitchFamily="34" charset="0"/>
+              </a:defRPr>
+            </a:lvl3pPr>
+            <a:lvl4pPr marL="1600200" indent="-228600">
+              <a:defRPr>
+                <a:solidFill>
+                  <a:srgbClr val="6F6F6F"/>
+                </a:solidFill>
+                <a:latin typeface="Trebuchet MS" panose="020B0603020202020204" pitchFamily="34" charset="0"/>
+                <a:ea typeface="Trebuchet MS" panose="020B0603020202020204" pitchFamily="34" charset="0"/>
+                <a:cs typeface="Trebuchet MS" panose="020B0603020202020204" pitchFamily="34" charset="0"/>
+                <a:sym typeface="Trebuchet MS" panose="020B0603020202020204" pitchFamily="34" charset="0"/>
+              </a:defRPr>
+            </a:lvl4pPr>
+            <a:lvl5pPr marL="2057400" indent="-228600">
+              <a:defRPr>
+                <a:solidFill>
+                  <a:srgbClr val="6F6F6F"/>
+                </a:solidFill>
+                <a:latin typeface="Trebuchet MS" panose="020B0603020202020204" pitchFamily="34" charset="0"/>
+                <a:ea typeface="Trebuchet MS" panose="020B0603020202020204" pitchFamily="34" charset="0"/>
+                <a:cs typeface="Trebuchet MS" panose="020B0603020202020204" pitchFamily="34" charset="0"/>
+                <a:sym typeface="Trebuchet MS" panose="020B0603020202020204" pitchFamily="34" charset="0"/>
+              </a:defRPr>
+            </a:lvl5pPr>
+            <a:lvl6pPr marL="2514600" indent="-228600" defTabSz="457200" eaLnBrk="0" fontAlgn="base" hangingPunct="0">
+              <a:spcBef>
+                <a:spcPct val="0"/>
+              </a:spcBef>
+              <a:spcAft>
+                <a:spcPct val="0"/>
+              </a:spcAft>
+              <a:defRPr>
+                <a:solidFill>
+                  <a:srgbClr val="6F6F6F"/>
+                </a:solidFill>
+                <a:latin typeface="Trebuchet MS" panose="020B0603020202020204" pitchFamily="34" charset="0"/>
+                <a:ea typeface="Trebuchet MS" panose="020B0603020202020204" pitchFamily="34" charset="0"/>
+                <a:cs typeface="Trebuchet MS" panose="020B0603020202020204" pitchFamily="34" charset="0"/>
+                <a:sym typeface="Trebuchet MS" panose="020B0603020202020204" pitchFamily="34" charset="0"/>
+              </a:defRPr>
+            </a:lvl6pPr>
+            <a:lvl7pPr marL="2971800" indent="-228600" defTabSz="457200" eaLnBrk="0" fontAlgn="base" hangingPunct="0">
+              <a:spcBef>
+                <a:spcPct val="0"/>
+              </a:spcBef>
+              <a:spcAft>
+                <a:spcPct val="0"/>
+              </a:spcAft>
+              <a:defRPr>
+                <a:solidFill>
+                  <a:srgbClr val="6F6F6F"/>
+                </a:solidFill>
+                <a:latin typeface="Trebuchet MS" panose="020B0603020202020204" pitchFamily="34" charset="0"/>
+                <a:ea typeface="Trebuchet MS" panose="020B0603020202020204" pitchFamily="34" charset="0"/>
+                <a:cs typeface="Trebuchet MS" panose="020B0603020202020204" pitchFamily="34" charset="0"/>
+                <a:sym typeface="Trebuchet MS" panose="020B0603020202020204" pitchFamily="34" charset="0"/>
+              </a:defRPr>
+            </a:lvl7pPr>
+            <a:lvl8pPr marL="3429000" indent="-228600" defTabSz="457200" eaLnBrk="0" fontAlgn="base" hangingPunct="0">
+              <a:spcBef>
+                <a:spcPct val="0"/>
+              </a:spcBef>
+              <a:spcAft>
+                <a:spcPct val="0"/>
+              </a:spcAft>
+              <a:defRPr>
+                <a:solidFill>
+                  <a:srgbClr val="6F6F6F"/>
+                </a:solidFill>
+                <a:latin typeface="Trebuchet MS" panose="020B0603020202020204" pitchFamily="34" charset="0"/>
+                <a:ea typeface="Trebuchet MS" panose="020B0603020202020204" pitchFamily="34" charset="0"/>
+                <a:cs typeface="Trebuchet MS" panose="020B0603020202020204" pitchFamily="34" charset="0"/>
+                <a:sym typeface="Trebuchet MS" panose="020B0603020202020204" pitchFamily="34" charset="0"/>
+              </a:defRPr>
+            </a:lvl8pPr>
+            <a:lvl9pPr marL="3886200" indent="-228600" defTabSz="457200" eaLnBrk="0" fontAlgn="base" hangingPunct="0">
+              <a:spcBef>
+                <a:spcPct val="0"/>
+              </a:spcBef>
+              <a:spcAft>
+                <a:spcPct val="0"/>
+              </a:spcAft>
+              <a:defRPr>
+                <a:solidFill>
+                  <a:srgbClr val="6F6F6F"/>
+                </a:solidFill>
+                <a:latin typeface="Trebuchet MS" panose="020B0603020202020204" pitchFamily="34" charset="0"/>
+                <a:ea typeface="Trebuchet MS" panose="020B0603020202020204" pitchFamily="34" charset="0"/>
+                <a:cs typeface="Trebuchet MS" panose="020B0603020202020204" pitchFamily="34" charset="0"/>
+                <a:sym typeface="Trebuchet MS" panose="020B0603020202020204" pitchFamily="34" charset="0"/>
+              </a:defRPr>
+            </a:lvl9pPr>
+          </a:lstStyle>
+          <a:p>
+            <a:pPr eaLnBrk="1">
+              <a:defRPr/>
+            </a:pPr>
+            <a:fld id="{E957024F-A389-415F-B6B3-B751FD29DF88}" type="slidenum">
+              <a:rPr lang="en-US" altLang="en-US" sz="600" smtClean="0">
+                <a:solidFill>
+                  <a:srgbClr val="FFFFFF"/>
+                </a:solidFill>
+                <a:latin typeface="Arial" panose="020B0604020202020204" pitchFamily="34" charset="0"/>
+                <a:cs typeface="Arial" panose="020B0604020202020204" pitchFamily="34" charset="0"/>
+                <a:sym typeface="Arial" panose="020B0604020202020204" pitchFamily="34" charset="0"/>
+              </a:rPr>
+              <a:pPr eaLnBrk="1">
+                <a:defRPr/>
+              </a:pPr>
+              <a:t>9</a:t>
+            </a:fld>
+            <a:endParaRPr lang="en-US" altLang="en-US" sz="600">
+              <a:solidFill>
+                <a:srgbClr val="FFFFFF"/>
+              </a:solidFill>
+              <a:latin typeface="Arial" panose="020B0604020202020204" pitchFamily="34" charset="0"/>
+              <a:cs typeface="Arial" panose="020B0604020202020204" pitchFamily="34" charset="0"/>
+              <a:sym typeface="Arial" panose="020B0604020202020204" pitchFamily="34" charset="0"/>
+            </a:endParaRPr>
+          </a:p>
+        </p:txBody>
+      </p:sp>
+      <p:pic>
+        <p:nvPicPr>
+          <p:cNvPr id="50178" name="Picture 2" descr="resultsKMeans.png">
+            <a:extLst>
+              <a:ext uri="{FF2B5EF4-FFF2-40B4-BE49-F238E27FC236}">
+                <a16:creationId xmlns="" xmlns:a16="http://schemas.microsoft.com/office/drawing/2014/main" id="{1B43268A-15B6-4394-A32E-C9D84694DAFA}"/>
+              </a:ext>
+            </a:extLst>
+          </p:cNvPr>
+          <p:cNvPicPr>
+            <a:picLocks noChangeAspect="1"/>
+          </p:cNvPicPr>
+          <p:nvPr/>
+        </p:nvPicPr>
+        <p:blipFill>
+          <a:blip r:embed="rId2">
+            <a:extLst>
+              <a:ext uri="{28A0092B-C50C-407E-A947-70E740481C1C}">
+                <a14:useLocalDpi xmlns:a14="http://schemas.microsoft.com/office/drawing/2010/main" val="0"/>
+              </a:ext>
+            </a:extLst>
+          </a:blip>
+          <a:srcRect/>
+          <a:stretch>
+            <a:fillRect/>
+          </a:stretch>
+        </p:blipFill>
+        <p:spPr bwMode="auto">
+          <a:xfrm>
+            <a:off x="-3175" y="-7938"/>
+            <a:ext cx="10798175" cy="5999163"/>
+          </a:xfrm>
+          <a:prstGeom prst="rect">
+            <a:avLst/>
+          </a:prstGeom>
+          <a:noFill/>
+          <a:ln>
+            <a:noFill/>
+          </a:ln>
+          <a:effectLst/>
+          <a:extLst>
+            <a:ext uri="{909E8E84-426E-40DD-AFC4-6F175D3DCCD1}">
+              <a14:hiddenFill xmlns:a14="http://schemas.microsoft.com/office/drawing/2010/main">
+                <a:solidFill>
+                  <a:srgbClr val="FFFFFF"/>
+                </a:solidFill>
+              </a14:hiddenFill>
+            </a:ext>
+            <a:ext uri="{91240B29-F687-4F45-9708-019B960494DF}">
+              <a14:hiddenLine xmlns:a14="http://schemas.microsoft.com/office/drawing/2010/main" w="12700" cap="flat" cmpd="sng">
+                <a:solidFill>
+                  <a:srgbClr val="000000"/>
+                </a:solidFill>
+                <a:prstDash val="solid"/>
+                <a:miter lim="400000"/>
+                <a:headEnd type="none" w="med" len="med"/>
+                <a:tailEnd type="none" w="med" len="med"/>
+              </a14:hiddenLine>
+            </a:ext>
+            <a:ext uri="{AF507438-7753-43E0-B8FC-AC1667EBCBE1}">
+              <a14:hiddenEffects xmlns:a14="http://schemas.microsoft.com/office/drawing/2010/main">
+                <a:effectLst>
+                  <a:outerShdw blurRad="63500" dist="38099" dir="2700000" algn="ctr" rotWithShape="0">
+                    <a:srgbClr val="000000">
+                      <a:alpha val="74998"/>
+                    </a:srgbClr>
+                  </a:outerShdw>
+                </a:effectLst>
+              </a14:hiddenEffects>
+            </a:ext>
+          </a:extLst>
+        </p:spPr>
+      </p:pic>
+    </p:spTree>
+  </p:cSld>
+  <p:clrMapOvr>
+    <a:masterClrMapping/>
+  </p:clrMapOvr>
+  <p:transition spd="med"/>
 </p:sld>
 </file>
 

</xml_diff>